<commit_message>
Cleanup before Fall 2018.
</commit_message>
<xml_diff>
--- a/Presentations/00 Intro - 22 Jan.pptx
+++ b/Presentations/00 Intro - 22 Jan.pptx
@@ -152,6 +152,130 @@
 
 <file path=ppt/revisionInfo.xml><?xml version="1.0" encoding="utf-8"?>
 <p1510:revInfo xmlns:a="http://schemas.openxmlformats.org/drawingml/2006/main" xmlns:r="http://schemas.openxmlformats.org/officeDocument/2006/relationships" xmlns:p1510="http://schemas.microsoft.com/office/powerpoint/2015/10/main"/>
+</file>
+
+<file path=ppt/ink/ink1.xml><?xml version="1.0" encoding="utf-8"?>
+<inkml:ink xmlns:inkml="http://www.w3.org/2003/InkML">
+  <inkml:definitions>
+    <inkml:context xml:id="ctx0">
+      <inkml:inkSource xml:id="inkSrc0">
+        <inkml:traceFormat>
+          <inkml:channel name="X" type="integer" max="3286" units="cm"/>
+          <inkml:channel name="Y" type="integer" max="1080" units="cm"/>
+          <inkml:channel name="T" type="integer" max="2.14748E9" units="dev"/>
+        </inkml:traceFormat>
+        <inkml:channelProperties>
+          <inkml:channelProperty channel="X" name="resolution" value="68.17427" units="1/cm"/>
+          <inkml:channelProperty channel="Y" name="resolution" value="39.8524" units="1/cm"/>
+          <inkml:channelProperty channel="T" name="resolution" value="1" units="1/dev"/>
+        </inkml:channelProperties>
+      </inkml:inkSource>
+      <inkml:timestamp xml:id="ts0" timeString="2018-01-22T23:12:46.497"/>
+    </inkml:context>
+    <inkml:brush xml:id="br0">
+      <inkml:brushProperty name="width" value="0.05292" units="cm"/>
+      <inkml:brushProperty name="height" value="0.05292" units="cm"/>
+      <inkml:brushProperty name="color" value="#FFFF00"/>
+    </inkml:brush>
+    <inkml:brush xml:id="br1">
+      <inkml:brushProperty name="width" value="0.05292" units="cm"/>
+      <inkml:brushProperty name="height" value="0.05292" units="cm"/>
+      <inkml:brushProperty name="color" value="#FF0000"/>
+    </inkml:brush>
+    <inkml:brush xml:id="br2">
+      <inkml:brushProperty name="width" value="0.05292" units="cm"/>
+      <inkml:brushProperty name="height" value="0.05292" units="cm"/>
+      <inkml:brushProperty name="color" value="#92D050"/>
+    </inkml:brush>
+  </inkml:definitions>
+  <inkml:trace contextRef="#ctx0" brushRef="#br0">18177 7620 0,'0'0'62,"40"0"-31,-40 0-15,41 0-16,-1 0 15,0 40 1,0 0-16,40 40 16,41-40-1,-41 81-15,-40-81 16,80 40-1,-80-80 1,1 40 0,-1 0-16,0-40 15,0 40-15,-40-40 16,40 0-1,0 40-15,0 1 16,0-41 0,-40 0-16,0 0 15,41 40 1,-41-40-1,0 0-15,0 40 32,40-40-1,-40 40 0</inkml:trace>
+  <inkml:trace contextRef="#ctx0" brushRef="#br0" timeOffset="1291.0019">19140 7580 0,'0'0'62,"-40"0"-46,40 0-1,0 40-15,-40 0 16,0 40-1,0-80 1,0 40-16,40 0 16,-40-40-1,40 41-15,-41-41 16,1 40-1,40-40-15,-40 0 16,40 40 0,-40 0-16,0-40 15,40 40 1,-40-40-16,40 40 15,-40 0-15,0-40 16,40 40 0,-41-40-1,41 0 1,-40 40-16,0-40 31,40 40-31,-40-40 16,0 41-16,40-41 15,-40 0 1,40 40-16,0-40 31,0 40-31,-80-40 0,80 40 16,0-40-1,0 0-15,-41 40 16,41 0-1,-40-40 1,40 0 0,0 40-1,-40-40-15,0 0 31,40 0-15,0 40 0</inkml:trace>
+  <inkml:trace contextRef="#ctx0" brushRef="#br1" timeOffset="35310.05">14606 4171 0,'-40'0'16,"40"0"15,0 0-15,0 0-1,0 40 1,40 0-16,0 0 15,0 0 1,41 0-16,-41 0 16,0 1-16,40-1 15,-80 0 1,80 0-16,-40 0 15,1-40 1,-1 80-16,40-80 16,-40 80-1,0-39-15,0-1 16,0-40-1,-40 80 1,41-80-16,-41 40 16,0-40-1,40 0 1,0 0-1,-40 40 17,0 0-1,0-40-31,0 0 15,40 0 17,-40 40-1,40-40-31,-40 0 15,40 0 1,-40 40-16,0-40 16</inkml:trace>
+  <inkml:trace contextRef="#ctx0" brushRef="#br1" timeOffset="36640.0519">15609 4171 0,'0'0'47,"0"0"-32,-40 80 1,0-80 0,0 40-16,40 0 15,-40 0 1,40-40-16,-40 40 15,-1-40 1,41 41 0,-40-1-16,0-40 15,0 40 1,40-40-16,-40 40 15,40 0 1,-40-40 0,0 40-1,40-40-15,-40 40 16,40-40-1,-41 40 1,1-40 0,40 40-1,0-40-15,0 0 16,-40 0-1,40 41 1,-40-41 0,40 0 15,0 40-31,-40-40 15,0 40 1,40-40 0,0 40-16,-40-40 15,40 40 1,0-40-16,-40 40 15,-1 0 1,41-40 0,0 0-16,-40 40 31,40-40-16</inkml:trace>
+  <inkml:trace contextRef="#ctx0" brushRef="#br1" timeOffset="41521.0588">14887 4291 0,'0'40'31,"-40"0"-31,40-40 0,0 40 15,-40 1 1,40-1-16,-40 0 16,40-40-16,0 80 15,-41-80 1,41 40-1,0-40 1,0 40-16,0 0 16,0-40 15,0 0-16,41 0-15,-1 0 16,40-40-16,-80 40 16,40 0-1,0-40 1,-40 40 15,0 0 16,0 80-47,0-40 15,0 1-15,-40 39 16,0-80 0,40 40-16,0-40 15,-40 40 1,40 0-16,0-40 15,0 0 1,0 0 15,40 0-15,0-40-16,0 0 15,121-121 1,-121 81-16,40 0 16,-40 0-1,-40 80-15,40-40 16,-40 0-1,0 40-15,0 0 63,0 0-48,0 40-15,0 0 32,0-40-32,0 80 15,0-80 1,0 40-1,0-40-15,0 40 16,0 0 0,0-80 46,0-40-62,0 40 16,0-40-16,0-1 15,0 81 1,0-40-16,0 40 15,0-40 1,0 40 15,0 40-15,0-40-1,0 40-15,0 1 16,0-1-16,0 0 16,0 0-1,0-40-15,0 40 16,0 0-1,0 0-15,0-40 16,0 40 0,0-40 15,40 0-16,1 0 17,-41 0-17,0 0 1,0-40 15,0 40 31,0 0-46,0 0-16</inkml:trace>
+  <inkml:trace contextRef="#ctx0" brushRef="#br0" timeOffset="62997.0892">14807 5695 0,'40'0'47,"-40"0"-47,40 0 16,-40 0-16,40 0 15,-40 0 1,40 0-16,0 40 16,41-40-1,-81 0 1,0 0-1,40 0 1,-40 0 0,80-40-16,-80-40 15,0 40-15,0-41 16,0 1-1,0 80-15,0-40 16,0 40 0,0 0-16,-40 0 31,0 0-31,0 80 15,-41 0-15,81 41 16,0-41 0,-40 0-16,40-40 15,0 0 1,0 0-16,0 1 15,0 39 1,0-40-16,0 0 16,0 0-1,40 0-15,-40-40 16,40 0-16,1 0 15,-41 0 1,40 0-16,40 0 16,-80 0-1,40-40-15,0 0 16,-40 0-1,40-40-15,-40 80 16,0-40 0,0-1-16,0 1 15,0 40-15,0 0 31,0 0-15,-40 0 0,0 0-16,0 0 31,0 40-31,40 1 15,-40-1-15,40 0 16,0-40 0,0 40-1,0-40 1,0 0-16,0 40 15,40-40 1,-40 0-16,40 0 16,0 0-1,0 0-15,0 0 16,0-80-16,1 80 15,-41-40 1,0 0-16,0-1 16,0 1-1,0 40-15,0-40 16,0 0-1,0 40-15,0 0 16,0 0 0,-41 0-16,1 0 15,-40 0-15,80 0 16,-40 0-1,0 0-15,0 40 32,40-40-32,0 40 15,0-40 1,0 40-1,0-40 1,40 0 0,0 0-16,40 0 15,41-40 1,-41 0-16,-40-40 15,0 40 1,-40 0-16,0-40 31,0 80-31,0-81 16,0 81-16,0-40 15,-40 40 1,0 0-16,40 0 16,-40 0-1,0 0-15,-1 0 16,1 81-1,-40-41-15,80 0 16,-40 0 0,40 0-16,-40 0 15,40-40 1,0 40-1,0 0-15,0-40 16,40 0 0,0 0-16,0 0 15,0 0 1,-40 0-16,81 0 15,-81-40 1,40-80-16,-40 40 16,0 40-16,0-1 15,-40 1 1,40 0-16,-41 40 15,1 0 1,0 0-16,40 0 16,-40 0-1,0 0-15,-40 0 16,-1 0-1,81 40-15,-40 0 16,0 1-16,40-41 16,0 40-1,0 0-15,0 0 16,0 0-1,0-40-15,0 40 16,0 0 0,0-40-1,0 0-15,80 0 16,-80 0-1,81 0-15,-81-40 16,0-40 0,0 40-16,0 0 31,0 0-31,0-1 0,0 41 15,0-40 1,0 40-16,0 0 16,-81 0-16,41 40 15,-80 41 1,80-1-16,0 0 15,0 0 1,-41-40-16,81 0 16,0-40-1,0 41-15,0-41 16,0 40-1,0-40 1,40 0-16,1 0 16,39 0-1,0-40-15,0 40 16,-80 0-1,40-41 1,-40 41 46</inkml:trace>
+  <inkml:trace contextRef="#ctx0" brushRef="#br1" timeOffset="76959.1088">13763 4652 0,'0'0'16,"0"-40"-16,0 0 31,0 40 47,0 40-62,0 0-16,40-40 15,-40 40 1,41 0-16,-1 0 16,0-40-16,0 0 15,40 0 1,-40-40-16,0 0 15,-40 0 1,0-40-16,0 80 16,0-80-1,0 80-15,0 0 16,-80 0-16,0 0 15,0 80 1,-1 0-16,1 0 16,40 1-1,40-81-15,0 40 16,0 0-1,0-40-15,0 40 32,120-40-17,-39 0-15,39-40 16,0 0-1,-39 0-15,-41-41 16,-40 41 0,0 0-16,0-40 15,0 80 1,0-40-1,0 40-15,-40 0 16,0 0-16,-41 0 16,41 0-16,40 0 15,-40 0 1,0 0-16,40 0 15,0 0 1,0 0 15,0 0-15,40 40-16,40-40 15,-40 0 1,1 0-16,39 0 16,-80 0-1,40 0-15,0-80 16,0 80-1,-40-81-15,0 81 16,0-40 0,-80 0-16,40 0 15,-81 40-15,1 0 16,0 0-1,-1 0-15,81 0 16,-40 40 0,40 0-16,0 0 15,40 1 16,0-41-15,40 80 0,40-40-16,0-40 15,1 0 1,39 40-16,0-40 15,-39 0 1,-1-40-16,0 0 16,-80 0-1,0-81-15,0 81 16,0 40-16,-40-80 15,40 80 1,-40 0-16,-40 0 16,39 0-1,1 0-15,-40 0 16,40 40-1,-40 0-15,80 0 16,-40 0 0,40-40-16,0 41 15,0-41-15,0 40 16,0 0-1,80-40-15,40 0 16,-40 0 0,41-80-16,-1-1 15,-80-39 1,0 0-16,-40 40 15,0-1 1,0 1-16,-80 80 16,40-40-16,-40 40 15,40 0 1,-41 0-16,1 0 15,40 80 1,0-40-16,0 41 16,0-81-1,40 80-15,0-80 16,0 40 15,0-40-15,0 40-1,0-40 16,0 40-31,0-40 16,0 0 0,0 40-1,0-40-15,0 40 16,0-40-1,0 40 1,0 0 0,0-40-16,-40 41 31,-1-41-31,41 40 15,0-40 1,0 40-16,0-40 16,0 40-16,0 40 15,0-40 1,41 40-16,-1-39 15,0-1 1,0-40-16,-40 0 16,40 0-1,0 0 1,0 0-16,0 0 15,-40 0 1,0-40-16,0-1 31,41 1-31,-1-80 0,-40 120 16,0-40-1,0 0-15,0 0 16,0 0 0,0 40-16,0 0 15,-81 0 1,41 0-1,-40 0-15,0 80 16,0-40 0,39 0-16,41 0 15,-40-40 1,40 40-16,0-40 78,0 0-63,0 0 1</inkml:trace>
+  <inkml:trace contextRef="#ctx0" brushRef="#br1" timeOffset="82911.1173">12921 4692 0,'0'0'16,"-40"0"-1,40 0-15,-81 0 16,81 0-16,-40 0 31,40 0-31,-40 0 16,40 0-16,0 0 15,0 40 1,0 0-16,0 1 16,0-41-1,0 0-15,40 40 16,0-40-1,41 0-15,39 0 16,-40 0 0,0 0-16,1-121 15,-41 81-15,0-40 16,-40 0-1,0 40-15,-40-41 16,-40 81 0,39 0-16,-39 0 15,-40 0 1,-81 0-16,81 41 15,-1 39 1,-39 0-16,120-40 16,-40 0-16,80 0 15,-41 0 1,41-40-16,0 41 31,0-41 0,81 0-31,39 40 16,0-40-16,-39 0 15,-1 0 1,40 0-16,-80 0 16,1-81-1,-1 81-15,0-80 16,-40 0-1,0 0-15,-40 40 16,-41-41 0,41 81-16,-40 0 15,40 0-15,0 0 16,-40 0-1,80 0-15,-41 41 16,41-1 0,0-40-16,0 40 15,0-40 1,0 0-1,0 0 1,81 0-16,39 0 16,-40 0-16,1-40 15,-1 0 1,-40-1-16,0 1 15,-40 40 1,0 0 31,-40 81-47,40-1 15,-40 40 1,40-80-16,0 40 16,0-39-1,0-1-15,0 0 16,0-40-1,0 0 17,0 40-17,40-40-15,0 0 0,40 0 16,-40 0-1,1-40-15,-1-40 16,0-41 0,-40 81-16,0-80 15,0 40 1,-80-1-16,-1 41 15,1 40-15,0-40 16,40 40 0,-81 0-16,81 0 15,40 0 1,-40 40-16,0 0 15,40 0 1,0-40-16,0 41 31,0-1-31,0-40 16,0 0-16,40 0 15,0 0 1,0 0-16,-40 0 16,40 0-1,-40 40 48,0-40-48,0 40 1,0-40-1,0 40-15,0 0 16,0-40 0,0 40 15,0-40-16,41 0-15,39 0 16,-80 0 0,40 0-16,0 0 15,0 0 1,-40 0-1,0 0 32,-40 0-31,40 0-16,-40 0 15,0 0 1,0 0-16,40 0 16,-40 0-1,40 0 1,0 0-1</inkml:trace>
+  <inkml:trace contextRef="#ctx0" brushRef="#br1" timeOffset="86262.122">4534 7459 0,'40'0'63,"-40"0"-48,41 0 17,-41 0-1,40 0-16,0 0 1,0 0 0,40 0-1,-40 0-15,121 0 16,-1 0-16,-39 41 15,-41-41 1,-40 40-16,80-40 16,41 40-1,-81-40-15,81 40 16,-41 0-1,41 0-15,-81-40 16,0 0 0,-40 40-16,40-40 15,81 40-15,-1-40 16,41 40-1,-81 1-15,-39-41 16,-1 0 0,0 0-16,1 0 15,-41 0 1,0 0-16,40 40 15,0-40-15,1 0 16,-41 40 0,80-40-16,-80 0 15,40 0 1,-39 0-16,79 0 15,-40 0 1,0 0-16,1 0 16,-1 0-1,-40 0-15,0 0 16,0 0-1,41 0 1,-41 0-16,0 0 16,40 0-1,-80 0-15,80-40 16,-80 40-1,0 0-15,40 0 16,-40-40 0,0 40 15,0 0-16,-120 0-15,0 0 16,-1-41 0,1 1-16,-41 40 15,-39-40 1,39 0-16,-79 0 15,79 40-15,1 0 16,-81-40 0,80 40-16,1 0 15,-81 0 1,80 0-16,1 0 31,-1 0-31,41 0 0,40 0 16,40 0-1,0 0-15,-41 0 16,41 0-1,-40 0-15,40 0 16,40 0-16,-40 0 16,0 0-1,-1 0-15,41 0 16,-40 0-1,0 0-15,-40 0 16,40 0 0,-40 0-16,39 0 15,-39 0 1,40 0-16,0 0 15,-80 0-15,79 0 16,1 0 0,40 0-1,-40 0 1,80 0 15,41 0-15,79-40-16,121-40 15,0 39 1,160-79-16,-80 40 15,-40 40 1,-40 0-16,-40 0 16,-80 40-1,-1 0-15,41 0 16,-121 0-1,40 0-15,-39 0 16,-1 40-16,0-40 16,-40 40-1,0-40-15,0 0 16,-40 0-1,41 0-15,-41 40 16,0-40 0,0 0-1,0 40 1,0 0-16,-81 0 15,-39 40-15,-121-39 16,0-1 0,-80 0-16,81 0 15,-41-40 1,-40 80-16,0-80 15,120 0 1,0 40-16,1-40 16,79 40-16,1-40 15,40 40 1,40-40-16,-41 41 31,81-41-31,-40 0 16,0 0-1,0 0-15,40 0 31,0 0-15,40 0 0,81-41-1,119-39-15,121 0 16,-80 40-1,40-40-15,-40 40 16,0 40 0,-120 0-1,39 0 1,-119 0-16,-1 0 0,-40 0 15,0-41-15,-40 41 16,40 0 0,0 0-1,-40 0 48,40 0-48,-40 0 1,41 0 15</inkml:trace>
+  <inkml:trace contextRef="#ctx0" brushRef="#br1" timeOffset="102616.1452">16372 12633 0,'0'-40'0,"-41"40"0,1-40 31,-80-40-31,80 80 16,0 0-1,40-40-15,-40 40 16,-1 0-16,41 0 62,0 0-62,0 80 16,41-40 0,-1 0-16,0 40 15,80-40 1,-80 0-16,0 0 15,41 1-15,-41-41 16,0 0 0,0 0-16,0 0 15,-40 0 1,40-41-16,-40 1 15,0 40 1,0-40-16,0 0 16,0 40-16,0-40 15,-80 40 1,-80 0-16,79 0 15,41 0 1,-40 80-16,-40-80 16,79 80-1,1-80-15,40 0 16,0 41-1,-40-1-15,40-40 16,0 40-16,0-40 31,0 0-15,0 40-1,40-40 1,0 0 0,1 0-16,39 0 15,0-40 1,0 40-16,1-80 16,-81 39-16,0 1 15,0-40 1,0 80-16,0-40 15,-41 0 1,-39 40-16,0 0 16,0 80-1,-1-40-15,41 40 16,0-39-16,0-1 15,40 40 1,0-80-16,0 80 16,0-80-1,0 40 16,0-40-31,0 0 16,80 0 0,1 0-16,-1 0 15,0-80-15,40 40 16,-39-40-1,-41-1-15,0 1 16,0-40 0,-40 40-16,0 40 15,-40 0 1,0-1-1,-40 1-15,-1 40 16,1 0-16,40 0 16,0 0-16,0 0 15,40 40 1,0 1-16,0-41 31,0 40-31,0-40 16,0 40-1,0-40-15,0 40 16,40 0-1,80-40 1,1 0-16,-41 0 16,40 0-1,-80 0-15,0 0 16,41 0-1,-81-40-15,40 40 16,-40-40 0,0 40-1,0-40-15,-80 40 16,39 0-1,-39 0-15,0 0 16,80 0 0,-40 40-16,40-40 15,0 40 1,0 0-1,0-40 1,0 40 0,0-40-1,0 0 1,40 40-16,0-40 15,-40 0 1,40 0 0,-40 0-1,0 0-15,0-40 16,0 40-16,-40-40 15,0 0 17,-40 40-32,-1 0 15,1 0-15,40 0 0,0 0 16,-40 0-1,80 40 1,0-40 0,-40 40-16,40 40 15,0-40-15,-41 0 16,41 1-1,0 39-15,0-40 16,0 0 0,0-40-16,0 40 15,41 0 1,-41-40-16,40 0 15,0 0 1,0 0-16,0 0 16,0-40-16,0 0 15,0 0 1,-40 0-16,41 0 15,-1 0 1,-40 40-16,0-41 16,0 1-1,0 40 1,-40 0-16,40 0 15,-41 0 1,1 0-16,0 81 16,40-81-1,0 40-15,-40-40 16,40 40-1,0-40 1,0 80 0,0-80-1,0 0-15,40 0 16,40 0-1,-39 0-15,-1 0 16,0 0 0,0 0-16,-40 0 31,40-80-31,0 40 15,0-41 1,-40 1-16,0 40 16,0 0-16,0 40 15,-40-40 1,0 0-16,0 40 15,40 0 1,-80 0-16,80 0 31,-40 0-15,40 0-16,0 40 31,0-40-15,0 40 15</inkml:trace>
+  <inkml:trace contextRef="#ctx0" brushRef="#br0" timeOffset="119133.0071">14887 12673 0,'40'40'16,"-40"-40"15,40 0-15,-40 0-1,0 0 1,0 0-1,0-40 17,0 40-32,0 0 46,40 0 48,0 0-78,1 0-16,-1-80 15,40 80 1,-80-40-16,0 0 15,0-40 1,0 80-16,0-41 16,0 41-1,-40 0 1,40 0-16,-40 0 15,-41 0 1,41 41-16,-40 39 16,40-40-1,40 40-15,-40-40 16,40 0-1,0-40-15,0 40 16,0-40 0,0 40-16,0-40 15,40 41 1,80-41-16,1 40 15,39-40-15,-39 0 16,-1 0 0,-40 0-16,-40 0 15,0 0 1,1-40-16,-41 40 15,40 0 1,-40-41-16,0 41 16,0-40-16,0 0 15,0 40 1,-40 0-16,-1 0 15,-39 0 1,40 0-16,0 0 16,0 40-1,0-40 1,40 40-16,0 1 15,0-41 1,0 40-16,0-40 31,0 40-15,0-40-1,40 0-15,0 0 16,-40 0 0,0 0-1,0 0 1,0-80-1,0 80-15,-40-41 16,40 41 0,-40 0-16,40 0 15,-40 0 1,-1 0-16,1 0 15,40 0 1,-40 0-16,0 0 16,40 0-16,-40 0 15,40 0 1,0 41-1,0-1 1,0-40-16,0 40 31,40-40-31,0 0 16,0 0-16,41 0 15,-1-40 1,-80 0-16,80-41 16,-40-39-1,-40 40-15,0 40 16,0 0-1,-40 0-15,0-1 32,40 41-32,-80 0 15,-1 0-15,41 0 16,-40 41-1,40-1-15,0 40 16,0-40 0,0 0-16,40 0 15,0 0 1,-41 40-16,1-80 15,40 41 1,0-1-16,0 0 16,0-40-16,0 40 15,0-40 1,40 0-16,1 40 31,-1-40-31,0 0 0,40 0 16,-80 0-1,40-40-15,-40 0 16,40 0-16,-40 0 15,0-1 1,0 41 0,0-40-1,0 40-15,-40 0 16,40 0-1,-80 0-15,40 0 16,0 0 0,40 0-16,-40 0 15,-41 40-15,41 41 16,0-81-1,40 40-15,0 0 16,0-40 0,0 0 15,0 0-31,80 0 31,41 0-31,-1 0 16,-40-40-16,-40-40 15,41-1 1,-81 41-16,40-40 15,-40 40 1,0 0-16,0 40 16,0-40-1,0 40-15,0 0 16,-40 0-16,0 0 15,-41 0 1,1 40-16,0 0 16,40 0-1,-41 40-15,81-80 16,-40 0-1,40 40-15,0-40 16,0 40 15,0-40 0,40 0-31,1 0 16,-1 0 0,0 0-1,-40 0 1,40 0-16,-40-80 15,0 80 1,0-40-16,0 40 16,0-40-16,0 40 31,0 0-16,-40 0 1</inkml:trace>
+  <inkml:trace contextRef="#ctx0" brushRef="#br1" timeOffset="135751.5092">16171 11470 0,'0'0'78,"0"0"-63,40 0-15,-40 0 16,40 0-16,0 0 15,0 0 1,-40 0 15,0 0 0,0 0-31,-40 0 16,40 0 0,-80 0-16,80 0 15,-40 40-15,40 0 16,-40-40-1,40 40-15,0-40 16,0 40 0,0-40-16,0 41 15,0-1 1,0-40-16,0 0 15,120 0 1,-40 0-16,-39-40 16,39-1-16,-40-39 15,40 40 1,-80-40-16,0 80 15,0-40 1,0 40-16,-40-40 16,-40 40-1,0 0-15,39 0 16,-39 0-16,80 0 15,-40 40 1,0 0-16,40-40 31,0 40-31,-40-40 16,40 40-1,0-40 1,0 40 0,0-40-1,0 40-15,40-40 16,0 0-1,-40 0-15,80 0 16,-80 0 0,40 0-16,-40 0 15,41 0 1,-41-40-16,0 0 31,0 40-31,0-40 16,0 40-16,0 0 15,-41 0 1,1 0-16,0 0 15,0 0 1,40 0-16,0 40 16,-40 0-1,0 0-15,40 41 16,0-81-16,0 40 15,0 0 1,0-40 0,0 40-1,80-40-15,40 0 16,1 0-1,-41 0-15,40-40 16,-39-40 0,-41-1-16,40 1 15,-80 40-15,0-40 16,-40 80-1,-40-80 1,-1 80 0,1 0-16,-40 0 15,80 40 1,0-40-16,-1 40 15,1 0 1,-40 40-16,40 0 16,0-40-16,40 1 15,-40-1 1,40 0-16,0-40 15,0 40 1,0 0-16,0-40 16,0 0-1,0 0-15,0 0 16,80 0-16,-40 0 15,40 0 1,1-80-16,-41 40 16,-40-41-1,0 41-15,0 0 16,0-40-1,0 80-15,0-40 16,-40 40 0,40 0-16,-41 0 15,1 0-15,40 0 16,-40 0-1,0 0-15,40 40 16,0-40 0,0 40-16,0-40 15,0 40 1,0 0-1,0-40 1,0 0 0,0 0-16,80 0 31,-80-40-31,0 40 15,0 0 1,0-40-16,0 40 31,-40 0-31,0 0 16,40 0-16,-80 0 15,80 0 1,0 0 46</inkml:trace>
+  <inkml:trace contextRef="#ctx0" brushRef="#br1" timeOffset="146658.4973">16372 13796 0,'0'0'0,"0"0"15,0-40 1,-41 40 0,41 0 15,0 0-16,0 40 1,0 0 0,0 0-1,0 0-15,0-40 16,0 41-1,0-41-15,0 40 16,41 0-16,-1-40 16,0 0-1,0 0-15,0 0 16,0-40-1,0 40-15,-40-40 16,0-1 0,0 41-16,0-40 15,0 0 1,-40 0-16,0 40 15,0 0-15,-40 0 16,40 0 0,-1 0-16,1 0 15,0 40 1,0-40-16,40 0 15,0 80 1,-40-39-16,0 39 16,40-80-16,0 80 31,0-80-31,0 40 0,0-40 15,0 40 1,40-40 0,0 40-1,0-40-15,0 0 16,81 0-1,-41-40-15,-40 0 16,40-80-16,-40 80 16,-40 0-1,41-1-15,-41 1 16,0 40-1,0-40-15,0 40 16,-81-80 0,41 80-16,0 0 15,-40 0 1,40 0-16,0 0 15,-41 0-15,41 0 16,0 40 0,0-40-16,0 40 15,40 0 1,0-40-1,0 40 1,0-40 0,0 0-16,40 0 15,-40 0 1,40 0-16,40 0 15,-40 0 1,41-40-16,-41 0 16,0 0-1,-40 0-15,0 40 16,0-40 15,0 40-31,0-40 0,0 40 16,-80 0-1,-1 0-15,1 0 31,40 0-31,-40 0 16,40 0 0,40 0-16,0 40 15,-40 0 1,40-40-16,0 40 15,0-40-15,0 40 16,0 0 0,80 0-16,-40 1 15,40-41 1,0 0-16,-39 0 15,39 0 1,-40 0-16,0 0 16,0-41-16,-40 41 15,0-40 1,0 0-16,0 0 15,0 40 1,0 0-16,-40-40 16,0 40-1,-40 0-15,40 0 16,-41 0-1,41 0-15,0 40 16,40-40-16,0 0 16,-40 40-1,40-40-15,0 80 16,0-80-1,0 41-15,0-41 32,0 0-32,40 0 15,0 0 1,0 0-16,-40 0 15,81 0 1,-81 0 0,40-41-1,-40 41 1,0-40-16,0 0 31,0 0-31,0 40 16,0 0-16,0 0 31,-40 0-16,40 0 1,0 0-16,0 40 31,0 0-31,0 0 16,0 1-1,0-41-15,0 40 16,0 0 0,80-40-1,-80 0-15,40 0 16,0 0-1,-40 0 1,40 0 0,-40-40-1,0 40 1,0-40-16,0 40 15,0-41 48</inkml:trace>
+  <inkml:trace contextRef="#ctx0" brushRef="#br1" timeOffset="156874.0916">16251 10507 0,'0'0'94,"0"0"-79,40 0-15,0 0 16,1 0 0,39 0-16,-80-40 15,40 0 1,-40 0-16,0 40 15,0-40 1,0 0 0,0 0-16,0 40 15,-40-40 1,40 40-16,-80 0 15,80 0 1,-41 0-16,1 0 16,0 0-16,0 0 15,40 0 1,-40 40-16,40 0 15,0 0 1,0 40-16,0-80 16,0 80-1,0-80 16,0 41-31,40-41 16,0 40-16,40-40 16,41 0-1,-1 0-15,-80-81 16,41 41-1,-81-40-15,0 40 16,0 0 0,0-40-16,-41 80 15,41-40 1,-80 40-16,40 0 15,0 0-15,-40 0 16,-1 0 0,81 0-16,-40 40 15,0 0 1,40 0-16,0 0 31,0-40-31,0 40 31,0-40-15,40 0-1,0 0 1,-40 0-16,41 0 16,-1 0-1,0 0-15,-40 0 16,0 0-1,0-80-15,0 80 16,0-40-16,0 0 16,0 40-1,-40 0-15,0 0 16,-41 0-1,81 0-15,-40 0 16,40 40 0,0-40-16,-40 40 15,0-40 1,40 40-16,0 0 15,0-40-15,0 40 16,0-40 0,40 40-16,-40-40 15,40 40 1,-40-40-16,80 0 15,-80 0 1,41 0-16,-41 0 16,40 0-16,0 0 15,-40 0 1,0-40-1,-40 40 1,-41 0-16,41 0 16,0 0-1,-40 0-15,40 0 16,0 0-1,40 0-15,0 0 16,-40 40-16,40-40 31,0 41-31,40-41 31,-40 0-31,40 40 16,80 0 0,-80-40-16,0 0 15,41 0 1,-81 0-16,40 0 15,0 0-15,0 0 32,-40 0-32,40 0 15,-40-40 1,0 0-16,0 40 15,0-41 1,0 41-16,-80 0 16,0 0-16,40 0 15,-41 0 1,41 41-16,0-41 15,40 40 1,0 0 15,0-40 0,0 0-31,40 40 16,0-40-16,121 0 16,-121 0-1,40 0-15,0-80 16,1 40-1,-81-1-15,40 1 16,-40-40 0,0 40-16,0-40 15,-40 40 1,0 0-16,-41 40 15,1 0 1,40 0 0,-40 0-16,40 0 15,-1 40 1,-39 0-16,40 0 15,40 0 1,0 0-16,-40 0 16,40-40-1,0 40 1,0-40-16,0 0 15,0 40 1,40-40-16,0 0 16,0 0-1,-40 0-15,81 0 16,-41 0-1,0-40-15,-40 0 16,0 0-16,0 0 16,0 0-1,0 0-15,-40 0 16,0 40-1,-1 0-15,-39 0 16,0 0 0,40 0-16,0 40 15,40-40 1,-40 40-16,40-40 15,0 0 1,0 40-16,0 0 16,0-40-16,0 40 15,0-40 1,40 0-16,0 0 15,0 0 1,0 0-16,0 0 16,0 0-1,0 0-15,-40 0 16,0-40-16,0 0 15,0 40 1,0-40-16,0 40 16,0 0-1,-40 0 16,0 0-31,-40 0 16,80 0 0,-80 40-16,80 40 15,0-40-15,0 0 31,0-40-31,0 0 16,0 0 0,40 0-16,0 0 15,40 0 1,41 0-16,-81 0 15,40-40 1,-40 0-16,-40 40 16,40-40-16,-40 40 15,0 0 16,-40 0-15,-40 0-16,0 0 16,-1 0-1,41 40-15,0-40 16,40 80-16,-40-80 15,40 41 1,0-41 15,0 0-15,40 0-1,0 0 1</inkml:trace>
+  <inkml:trace contextRef="#ctx0" brushRef="#br1" timeOffset="159729.8486">4414 12513 0,'0'0'78,"40"0"-78,80 0 16,201 0-1,41 0 1,320 0-1,-121 0-15,122 0 16,-202 0 0,-39 0-16,-41 0 15,-120 0-15,0 0 16,-121 0-1,-40 40-15,-39-40 16,-41 0 0,0 0-16,-40 40 62,-40-40-62,-40 40 16,-1-40-16,-159 0 15,39 0 1,0 40-16,1-40 15,39 0 1,-240 0-16,40 0 16,-81 0-1,81 0-15,40 0 16,121 0-16,-41 0 15,120 0 1,-39 0-16,80 0 16,-1 0-1,1 0 16,80 0-31,-40 0 0,40 0 78,201-40-62,441 40 0,-81 0-1,-280 0 1,-160 0-16,-81 0 15,-40-40 17,-40 0-32,-161 0 15,0 40 1,-120 0-16,-40 0 15,0 0 1,40 0-16,-120 0 16,-1 0-1,41-40-15,-40 40 16,120-40-16,40-1 15,40 1 1,161 40-16,0 0 16,39 0-1,41-40-15,41 0 31,79 40-15,161-40 0,120-80-16,281 39 15,-80 41-15,201-80 16,-201 40-1,-161 80-15,-200-40 16,-121 40 0,-80 0-16,0 0 15,-40 0 32,-80 0-31,0 0-16,40 0 15,-121 40 1,-39 0-16,39 0 31,41 0-31,-1 0 16,81 0-1,-40-40-15,80 40 16,0-40-1,40 0 1,0 0-16,161 0 16,-41 41-1,121-1-15,120 80 16,-79-40-1,-122 0-15,-39 41 16,-121-121 0,0 40-16,-40-40 15,0 40 1,-40-40-1,-81 0-15,1 0 16,-81 0 0,-39-40-16,119 0 15,-39 40 1,-1-40-16,41 0 15,80-1 1,-41 41 0,1-40-16,40 40 15,40-40 1,0 40-1,80 0 1,41 0-16,119-40 16,1 40-1,120 0-15,-80 0 16,-80 0-16,-121 0 15,41 0 1,-41 0-16,-80 0 16,0 0 30,-40 0-46</inkml:trace>
+  <inkml:trace contextRef="#ctx0" brushRef="#br0" timeOffset="176278.2092">18779 8061 0,'0'0'78,"40"0"-78,0 0 16,-40 0-1,0 0-15,0 0 16,0-40-16,0 0 31,0 40-31,0 0 16,0 0-1,-80 0-15,-40 40 16,80 40-1,-41 0-15,81-40 16,-80 41 0,80-41-16,0-40 15,0 40 1,0 0-1,0-40 1,0 0 0,0 0-16,40 0 15,0 0 1,1 0-16,-1 0 15,0-40 1,-40 40-16,40-80 16,0 80-16,-40-40 15,0-1 1,0 1-16,0 0 15,0 40 1,-40-40-16,0 40 16,-40 0-1,39 0-15,1 0 16,-80 40-1,120-40-15,-40 40 16,40 41-16,0-81 16,0 40-1,0-40-15,0 40 31,0-40-31,80 0 16,-80 0 0,40 0-16,-40 0 15,80 0 1,-80 0-16,81-80 15,-41-1-15,0 41 16,0-80 0,-40 40-16,0 40 15,-80-41 1,40 81-16,0 0 15,-41 0 1,-39 0-16,80 0 16,-40 0-16,-1 0 15,81 41 1,-40-41-16,40 40 15,0 0 1,0-40 0,0 0-1,0 40-15,40-40 16,0 0-1,41 0-15,-41 0 16,40 0-16,0 0 16,-80 0-1,40 0-15,-40 0 16,41 0-1,-41-40 1,0 0 0,0 40-16,0-40 15,0 40 1,0 0-16,0 0 15,-81 0-15,81 40 16,0 0 0,-40-40-16,40 40 15,0-40 1,0 40-16,0 0 15,0-40 1,0 0 0,80 0-16,-80 40 15,81-40 1,-41 0-16,-40 0 15,80 0 1,0 0-16,-80-40 16,40 40-1,1-80-15,-41 80 16,0-40-1,0 40-15,0-40 16,0 40-16,0 0 16,-41 0-1,1 0 1,40 0 15,0 0-15,0 40-16,0-40 31,0 40-16,0-40 1,40 40 0,-40-40-16,41 0 15,-1 0 1,0 0-1,-40-40 1,0 40-16,40 0 16,-40-40-16,0 40 15,0-40 1,-40 40-1,40 0 1,-40 0-16,0 40 16,-1 0-1,1 40-15,-40-40 16,80 40-1,0-80-15,-40 40 16,40 1 0,0-1-1,0-40-15,0 40 16,0-40-1,0 0 1,40 0 0,0 0-1,-40 0 1,40 0-16,0-121 15,-40 41 1,0-40-16,0 80 16,-40-80-16,0 120 15,0-41 1,40 41-16,-40 0 15,0 0 1,40 0 0,-40 0-1,40 0 1,-40 0-16,40 81 0,0-81 15,0 40 1,0 0-16,0 0 16,0-40-1,0 40-15,0-40 16,80 40-1,-40-40 1,-40 0 0,40 0-1,0 0-15,-40 0 16,40-40-1,-40 40-15,0-40 16,0 0 0,0 40-16,0 0 15,-40 0 1,0 0-16,0 0 15,40 0 1</inkml:trace>
+  <inkml:trace contextRef="#ctx0" brushRef="#br1" timeOffset="187884.6072">20906 9184 0,'0'0'78,"0"0"-62,0 0 31,0 0-47,-40 0 15,0 0 1,40 40 0,0-40-1,0 40 1,0-40-1,40 0 1,-40 40-16,40-40 16,0 0-16,0 0 31,-40 0-31,40 0 15,-40-40 1,40 40-16,0-40 16,-40 0-1,0 0-15,0 40 16,0-40-1,0 40 1,-40 0-16,-40 0 16,40 0-1,0 0-15,-40 0 16,80 80-1,-41-80-15,41 40 16,-40 0 0,40 0-16,-40 0 15,40-40 1,0 41-16,0-1 15,0 0-15,40 0 16,-40 0 0,40-40-16,41 0 15,-1 40 1,40-40-16,-39 0 15,-1 0 1,-40 0-16,0 0 16,0-80-16,0 80 15,-40-80 1,0 40-16,0-1 15,0 1 1,0 40-16,0 0 16,-40-40-1,0 40-15,-40 0 16,0 0-1,-1 40-15,-39-40 16,40 121 0,40-121-1,-41 80-15,81-80 16,-80 80-1,80-80-15,0 0 16,0 40 0,0-40-16,0 40 15,0 0 1,0-40-16,40 0 15,0 0-15,0 0 16,1 0 0,-1 0-16,0 0 15,0 0 1,40-40-16,-40 0 15,-40 0 1,0-120 0,0 79-16,0-39 15,0 80 1,-80 0-16,0 0 15,0 40 1,39 0-16,-39 0 16,40 40-1,0-40-15,40 40 16,-40-40-1,40 40-15,0 0 16,0-40-16,0 40 16,0-40-1,0 40-15,0 1 16,0-41-1,40 0-15,80 0 16,41 0 0,-81 0-16,0-41 15,1 1 1,-1 0-16,-80-40 15,40 0 1,0 0 0,-40-1-16,0 1 15,0 80 1,0-40-16,0 0 15,-80 40 1,80 0-16,-40 0 16,-41 0-16,41 80 15,-40-40 1,80 0-16,-40 0 15,40-40 1,-40 41-16,40-1 16,0 0-1,0 40-15,0-80 16,0 40-1,0-40-15,40 0 16,-40 40-16,40-40 16,0 0-1,0 0-15,-40 0 16,40 0-1,-40-40-15,41 0 16,-41 40 0,0-40-16,0 0 15,0 0 1,0 0-16,0 40 15,-41 0-15,1 0 16,0 0 0,0 0-16,40 0 15,-80 0 1,80 40-16,-40 0 15,-41 40 1,81-80-16,0 40 16,0 40-16,0-80 31,0 40-31,0-40 15,0 41 1,0-1-16,41-40 16,-1 0-1,0 0-15,40 0 16,0 0-1,1 0-15,-1-81 16,0 1-16,-80 40 16,40-40-1,0 40-15,-40 0 31,0 0-31,0-1 16,0 41 0,0 0-16,-80 0 15,40 0 1,0 41-16,-40-1 15,39-40-15,1 40 16,40-40 0,-40 0-16</inkml:trace>
+  <inkml:trace contextRef="#ctx0" brushRef="#br1" timeOffset="199432.8881">21147 7901 0,'0'-40'31,"0"40"-31,0 0 0,-41 0 16,41 0-1,-40 0-15,0 0 16,0 40-16,40 0 16,0-40-1,-40 40-15,40 0 16,0-40-1,0 0 17,40 0-17,0 0 1,-40 0-16,40 0 15,-40-40-15,40 0 16,-40 0 0,0 0-16,0 40 31,-40 0-16,40 0 1,-80 0-16,40 40 16,-40 40-1,40-40-15,-1 40 16,41-80-1,-40 80 1,40-80-16,0 40 16,0-40-1,0 41-15,40-41 16,-40 0-1,41 40-15,-1-40 16,40 0-16,-40 0 16,0 0-1,0-40-15,0 40 16,-40-81-1,0 81-15,0-40 16,0 40 0,-40 0-16,-40-40 15,0 40 1,40 0-1,-41 0-15,1 0 16,40 0 0,-40 40-16,80 0 15,-40 0 1,40 1-16,0-1 15,0-40 1,0 40-16,40-40 16,40 0-1,-40 0-15,40 0 16,1 0-16,39 0 15,-40 0 1,-40-80-16,41 39 16,-81 1-1,40-80-15,-40 80 16,0 0-1,0 0-15,-40 40 16,-41-40-16,41 40 16,0 0-1,-40 0 1,40 0-1,-40 80-15,39-80 16,1 80 0,40-80-16,0 40 15,0-40 1,0 40-16,0 0 15,0-40-15,0 0 16,40 0 0,1 0-16,39 0 15,0 0 1,-40-80-16,-40 80 15,0-40 1,0 0-16,0 0 16,0 40-1,0-40-15,0 40 16,-40 0-16,0 0 15,0 0 1,0 40-16,40 0 16,-81 0-1,81 40-15,-40-40 16,40 0-1,0 1-15,0-1 16,0-40 0,40 40-1,81-40-15,-41 0 16,0-40-1,1-41-15,-81 41 16,0-40 0,0 80-16,0-40 15,0 40 16,0 0-15,0 0 0,-81 40-16,81 40 15,-80-80 1,80 81-16,0-81 15,0 40 1,0-40 31</inkml:trace>
+  <inkml:trace contextRef="#ctx0" brushRef="#br2" timeOffset="215972.2307">20585 6978 0,'0'0'47,"0"0"-16,40 0 16,0 0-16,0 0-31,-40 0 16,40 0 0,0 0-16,1 0 15,-41 0 1,0 0-1,0 0 32,0 40-31,0 0-16,-41 1 15,41-1 1,0 0-16,0 0 16,0 0-16,0-40 15,0 40 1,0-40-16,0 0 15,0 0 1,81 0-16,-1 0 16,-40 0-1,40-40-15,1-40 16,-1 0-1,-40-1-15,-40 1 32,0 40-32,0 0 15,0 0-15,0 40 16,0 0-1,-40 0-15,40 0 32,-40 0-32,-41 0 15,41 0 1,-40 80-16,80-40 15,-80 40-15,40-40 16,40 1 0,0-1-16,0-40 15,0 40 1,0 0-16,0-40 15,0 40 1,40-40-16,40 0 16,0 0-16,1 0 15,-41 0 1,0-40-16,0 40 15,-40-40 1,40 0-16,-40-41 16,0 1-1,0 40-15,0 40 16,0-40-1,-40 0-15,0 40 16,0 0-16,-81 0 16,41 0-1,40 0-15,-40 0 16,40 40-1,-1 0-15,41-40 16,-40 40 0,40-40-16,0 40 15,0-40 1,0 40-1,0-40 1,0 41 0,40-41-16,1 0 31,-1 0-31,0 0 0,40-81 31,0 41-31,-80 0 16,40-40-16,-40 40 15,0 0 1,0 0-16,0-1 15,-80 41 1,40-40-16,-40 40 16,0 0-1,-1 0-15,1 40 16,40-40-1,-80 81-15,120-41 16,-41 0-16,41-40 16,0 40-1,0 0-15,0-40 31,0 40-31,41-40 16,39 0 0,-40 0-16,40 40 15,-40-40 1,-40 0-16,81 0 15,-81 0-15,40 0 16,-40 0 0,40 0-1,-40 0 1,0-40 15,0 40-31,0 0 0,0 0 16,-40 0-16,0 0 15,-1 0 1,41 0-16,-40 0 15,40 40 1,0-40-16,0 40 31,0-40 16,40 0-31,-40 0-1,41 0-15,-41 0 16,40 0-1,-40 0 1,0-40 0,0 0-1,0 40 16,0 0-31,-40 0 16,-1 0 0,1 40-16,40 0 15,-40 1 1,40-1-16,0-40 15,0 40 1,0 0 0,0-40-16,0 0 15,40 0 1,0 0-16,41 0 15,-1 0 1,-40-40-16,0 0 16,0-41-1,0 41-15,-40 0 16,0 0-1,0 0-15,0 40 16,0-40-16,0 40 16,0 0-1,-80 0-15,-40 40 16,40 0-1,-1 80-15,-39-39 16,80-1 0,0-40-1,40 0 1,0 0-16,0-40 15,0 0 48,0 0-63,0 0 15</inkml:trace>
+  <inkml:trace contextRef="#ctx0" brushRef="#br1" timeOffset="223229.8618">21066 10307 0,'0'80'16,"-40"-80"-1,40 80-15,-80-80 16,80 81-1,-40-81-15,0 40 16,40-40 0,0 40-1,0-40 48,40 0-63,0 0 0,40-40 15,-80 0 1,40 40-1,-40-41 1,0 1-16,0 40 16,0 0-16,-40-40 15,-40 40 1,40 0-16,-40 0 15,-1 0 1,1 40-16,40 0 16,-40 1-1,80-41 1,0 40-16,0 0 15,0-40 1,0 0 0,40 0-1,40 0-15,-40 0 16,81 0-1,-81 0-15,40-40 16,-40 0 0,0-1-16,0 1 15,-40 0-15,0 40 16,-40-40 15,0 40-15,0 0-16,0 0 15,40 0 1,-40 0-16,0 0 15,40 40 1,-41-40-16,41 40 16,0-40 15,0 40-31,0-40 15,41 41 1,-1-41-16,40 0 31,40 0-31,-39 0 16,-41-41-16,40 1 15,-80 40 1,0-40 0,0 40-1,0-40-15,0 0 16,0 40-1,0-40-15,0 40 16,-80 0 0,-1 0-16,41 0 15,0 0-15,40 0 16,-40 0-1,0 0-15,0 0 16,40 0 15,0 0-15,0 0-1,40 40 1,0 0-16,0-40 16,-40 0-16,40 0 15,0 0 1,1 0-16,-1 0 15,-40-40 1,0 0-16,0 40 16,0-40-1,0 40-15,0-40 16,0 40-16,-40 0 15,-1-40 1,-39 40-16,0 0 16,40 0-1,-40 40-15,-1 0 16,81-40-1,-40 40-15,0-40 32,40 0-32,0 40 15,0-40 16,40 0-31,-40 40 16,40-40 0,41 40-16,-81-40 15,80 0 1,-80 0-16,40 0 15,-40 0 1,80 0-16,-80 0 16,0-40-16,0 0 15,0 40 1,0-40 15,0 40-31,-40 0 16,0 0-1,0 40-15,-40 40 16,39-40-16,-39 0 15,80 1 1,-40-1-16,40-40 16,0 40-1,0 0 1,0-40-1,0 40-15,0-40 16,80 0 0,1 0-16,-41 40 15,0-40-15,40 0 16,-40 0-1,0 0-15,-40 0 16,40 0 0,1 0-16,-1-40 15,-40 0 1,0 0-1,0-40 1,0 80 0,0-41-16,0 41 15,0 0 1,-81-40-16,41 40 15,-40 0 1,0 0-16,80 0 16,-40 0-1,40 40-15,-81-40 16,81 41 15,0-1-31,0-40 0,0 40 16,0-40-1,0 40-15,0 0 16,41-40-1,39 0-15,40 0 16,-80 0 0,0 0-16,1 0 15,-41-40-15,40 40 16,0-80-1,0-1-15,-40 1 16,0 0 0,0 40-16,0 0 15,0 40 1,0-40-16,0 0 15,-40 40 1</inkml:trace>
+  <inkml:trace contextRef="#ctx0" brushRef="#br1" timeOffset="228250.9841">7704 9866 0,'0'0'31,"0"0"47,-40 0-62,-160 0-1,-122 0-15,-39 0 16,0 0-16,80 0 15,0-40 1,81 0-16,79-1 16,41 1-1,0 40-15,40-40 16,0 40-1,0-40-15,40 40 47,-41 0-47,41 0 63,41 0-63,79 40 15,81 40 1,160 1-16,80-1 15,121-40 1,-81-40-16,-39 0 16,-121 0-16,-80 0 15,-121 0 1,-80 0-1,0 0 1,-40 40 0,-40 0 15,-161-40-31,-79 0 15,-122 0 1,41 0-16,-80 0 16,120 0-1,-40 0-15,200 0 16,-40 0-1,81 0-15,0 0 16,80 0 0,-1 0-16,1 0 15,80 0 32,121-40-31,80 40-16,80-80 15,200 40 1,-119-40-16,-121-81 15,-81 121 1,-79-40-16,-41 40 16,-40 40-16,-40 0 31,-201 0-16,-120 80 1,-80 0-16,-81 0 16,1 1-1,120-1-15,-40-40 16,120 0-16,120 0 31,41 0-31,40-40 0,80 0 62,120 0-62,-40-40 16,81 0 0,120 40-16,160-40 15,40 40-15,81 0 16,-241 0-1,0 0-15,-160 0 16,-1-40 0,-120 40-16,1 0 15,-41 0 1,-41 0-1,-79 0 1,-161 0-16,0 0 16,-160 0-16,120 40 15,0-40 1,40 40 15,40 0-31,121-40 0,80 40 16,0-40-1,40 0-15,0 0 16,120 0-1,121 0 1,80 0-16,240-80 16,-119 0-1,-81 40-15,-40-41 16,-160 41-1,-41-40-15,-40 80 16,-80 0 15,-80 0-31,-321 40 16,39 40-1,1 1-15,80-41 32,-40 0-32,161 0 15,40 0 1,39-40-16,81 0 15,-40 40 1,80-40 0,0 0-1,121 0 1,120 0-16</inkml:trace>
+  <inkml:trace contextRef="#ctx0" brushRef="#br0" timeOffset="247275.3363">12921 15039 0,'0'-80'16,"0"80"-1,0-40-15,0 40 31,-40-40-15,-1 40 0,41 0-16,-40 0 15,0 0 1,0 0-16,0 80 15,40 0 1,0-40-16,0 1 16,0-1-16,0 0 15,0-40 1,80 40-16,-80-40 15,40 0 1,0 0-16,1 0 16,39-40-1,0 0-15,-40-41 16,40 41-1,-39 0 1,-41-40-16,0 40 0,0 0 16,0 0-1,0 0-15,0 40 16,-41 0-1,41 0-15,-40 0 16,0 0 0,-40 0-16,0 40 15,40 0-15,-1 40 16,1-40-1,40 40-15,-40-80 16,40 40 0,0 1-16,0-1 15,0-40 1,0 40-1,0-40 1,0 0 0,80 0-16,-39-40 15,-1 40 1,40 0-16,-80-81 15,0 81 1,0-40-16,0 0 16,0 0-1,0 40-15,-40-40 16,0 40-16,40 0 15,-40 0 1,-1 0-16,1 0 16,-40 0-1,40 40 1,40 0-1,0 0-15,0 0 32,0-40-32,0 41 15,0-41-15,40 0 16,0 0-1,-40 0-15,40 0 16,0 0 0,1 0-1,-41 0 1,0-41-16,0 41 31,0 0-31,0 0 16,-41 0-16,1 0 15,0 0 1,40 0 15,0 0 0,0 0-15,0 0-1,40 0 1,0 0-16</inkml:trace>
+  <inkml:trace contextRef="#ctx0" brushRef="#br0" timeOffset="258331.6253">12921 8181 0,'0'-40'31,"0"40"-15,0-40-16,0 40 16,-40 0-1,-1 0 1,1 0-16,40 0 15,-40 0 1,40 0-16,-40 0 16,40 0-1,0 40-15,0 0 16,0-40 15,0 0-31,40 0 16,40 0-1,1 0-15,-1 0 16,0 0-1,-40-120-15,0 120 16,1-80 0,-41 40-16,0 40 15,0-80 1,0 39-16,-41 1 15,1-40-15,-80 80 16,-41 0 0,41 0-16,0 0 15,39 40 1,1 0-16,0 41 15,40-41 1,0 0-16,40-40 16,0 40-16,0-40 15,0 40 32,0 0-31,40-40-1,0 0-15,80 0 16,-39 0-1,39 0-15,-80-80 16,40 80-16,-40-80 16,-40 80-1,41-81-15,-41 81 16,0-40 0,0 40-16,0-40 15,0 0 1,-41 40-16,41 0 15,-40 0 1,0 0-16,0 40 16,40-40-16,-40 40 15,40-40 1,0 40-1,0 1 1,0-41-16,0 40 16,0-40-1,0 40-15,40 0 31,-40-40-31,80 0 16,-80 0-16,40 0 0,-40 0 16,41 0-1,-41 0-15,40-40 16,-40 40-1,0-40 1,0 40 0,0 0-16,-40 0 15,-41 0-15,41 0 16,0 0-1,0 0-15,40 0 16,-40 40 0,40 0-1,-40 0 1,40 0-16,0 40 15,0-40 1,0-40-16,0 40 16,40 1-1,-40-41-15,40 40 16,0-40-16,40 80 15,1-40 1,-1-40-16,-40 0 16,80 0-1,-39 0-15,-1-40 16,-40 0-1,0-40-15,0 39 16,-40 1-16,0 0 16,0 0-1,0 0-15,0 40 16,-80 0-1,-40 0-15,39 0 16,41 0 0,-80 0-16,80 40 15,-41 0 1,41-40-16,40 40 15,-40-40-15,40 0 16,-40 40 0,40-40-16,0 41 15,0-1 1,0-40-16,0 40 15,40-40 1,40 0 0,-80 0-1,41 0-15,-41 0 16,80 0-16,0-40 15,-40-41 1,-40 1 0,0 0-1,0-40-15,0 80 16,0 40-1,0-40-15,-40-1 16,40 41-16,-40 0 16,-40 0-1,40 0-15,-1 41 16,41-41-1,-40 0-15,40 40 16,-40 40 0,40-80-16,0 40 15,0 0 1,0-40-16,40 0 15,-40 40-15,40-40 16,41 0 15,-1 0-31,-40 0 16,0 0-16,-40 0 15,40 0 1,-40 0 0,0 0-1,0 0 1,-40 0 15</inkml:trace>
+  <inkml:trace contextRef="#ctx0" brushRef="#br0" timeOffset="266318.7268">19782 14719 0,'0'0'31,"0"0"-15,0-41-1,0 41 1,0-40-16,0 0 16,0 40 15,-40 0-16,40 0-15,-40 40 16,0 0 0,0 41-16,40-41 15,-40 40-15,40 0 16,-40 0-1,40-80-15,0 40 16,0 1 0,0-41-16,0 40 15,40-40 1,0 0-16,120 0 15,-79 0 1,-1-40-16,0-1 16,0 41 15,-40-40-31,1 0 0,-41 40 15,40-40 1,-40 0-16,0 0 16,0 0-1,-81 0-15,41 40 16,0 0-16,-40 0 15,0 0 1,-1 0-16,41 0 16,-40 0-1,80 0-15,-40 40 16,40-40-1,0 40-15,-40-40 16,40 40 15,0 0-31,0-40 16,0 0-1,40 40-15,-40-40 16,40 0 0,0 0-16,40 0 15,-39-40 1,-1 0-16,0 40 15,-40-80 1,0 80-16,0-40 16,0 40-16,0 0 15,-40 0 1,0 0-16,-1 0 15,1 0 1,0 80-16,40-40 16,-40 0-1,40 40-15,0-40 16,0 41-16,0-1 15,0-40 1,0 0-16,0 0 16,40-40-1,0 0-15,-40 0 16,40 0-1,41 0-15,-41-40 16,0 40 0,-40-80-16,0 40 15,0 40-15,0-80 16,0 80-1,0-81-15,-40 81 16,0-40 0,0 40-16,-81 0 15,41 0 1,40 0-16,0 0 31,0 0-31,40 0 16,-41 0-16,41 0 15,0 40 1,0-40-1,0 40 1,0 1-16,41-41 16,-41 0-1,80 0-15,0 0 16,-40 0-16,-40 0 15,40 0 1,0-41-16,-40 41 16,41-40-1,-41 40-15,0-40 16,0 0-1,0 40 1,0 0 0,-81 0-16,1 0 0,40 0 15,0 0-15,-40 0 16,80 40-1,-41-40-15,41 40 16,-40 0 0,40-40-16,0 41 15,0-41 16,40 0-15,41 40-16,-41-40 16,0 0-16,40 0 15,-40 0 1,0 0-16,-40-40 15,41-1 1,-41 1-16,0 40 16,0-40-1,0 0 1,-41 0-16,1 40 15,0-40 1,-40 40-16,40 0 16,0 0-1,0 0-15,40 0 16,0 40-1,0 40-15,0-80 16,0 40 0,0-40-16,0 40 15,0 1-15,0-41 16,80 0-1,40 0-15,-80 0 16,41 0 0,-81-41-16,40 1 15,-40 0 1,0-40-16,0 80 15,0-40 1,0 40-16,-81 0 16,81-40-16,-40 40 15,40 0 1,-40 0-16,0 0 15,40 0 1,0 0-16,0 40 16,0-40-1,0 40 1,0-40-16,40 0 15,-40 0 1,40 0-16,-40 0 16,40 0-1,-40 0 16,0 0-15,0 0 15,0 0-31,-40 0 16,40 0-1,-40 0 1,40 0 0,0 0 15,0 0 0,40 0-31,-40 0 16,40 0-16,1 0 31,-41 0-31,0 0 0,0-40 15,0 40 1,0-40 0,0 40-1,-41 0 1,41 0 15,0-40 63</inkml:trace>
+  <inkml:trace contextRef="#ctx0" brushRef="#br0" timeOffset="276583.42">17214 8021 0,'0'40'16,"0"-40"15,40 0-16,-40 0 1,40 0 0,-40 0-1,0-40-15,0 40 16,0-40-1,0 0 1,0 40 0,0 0-1,-80 0-15,40 0 16,0 80-1,-40-40-15,40 0 16,40 40 0,0-80-16,0 40 15,0 1-15,0-41 16,0 40-1,80-40-15,0 0 16,0 0 0,1 0-16,39-40 15,-40-1 1,0-39-16,1 80 15,-41-80 1,40 40 0,-80-80-16,0 80 15,0-1-15,0 1 16,-40 0-16,0 40 15,-40 0 1,-1-40-16,41 40 31,0 0-31,0 0 0,40 0 16,-40 0-16,0 0 31,40 0-31,0 0 16,0 40-1,0-40-15,0 40 16,0 0-1,40-40-15,-40 0 16,40 0 0,0 0-16,0 0 15,0 0-15,0 0 16,-40 0-1,0 0-15,0-40 16,0 40 0,0-40-1,-40 40 1,0 0-16,0 0 15,0 0 1,0 40-16,0-40 16,40 40-16,0 1 15,0-1 1,0 0-1,0-40 1,0 0-16,120 0 16,-80 0-1,40 0-15,1 0 16,-81-40-16,40 0 15,-40-1 1,0 41-16,0-40 31,0 40-31,0 0 16,-80 0-1,39 0-15,1 0 16,40 0 0,-40 40-16,40 1 31,0-41-16,0 40 17,0-40-32,0 0 31,0 0-16,0 0 32,0 0-31,0 0-16,-40 0 15,0 40 1,40 0-16,-40-40 16,40 40 15,0-40 0,0 0-31,80 0 16,-80-40-1,40 40 16,-40 0-31,0-40 0,0 40 0,0-40 16,0 40 0,0 0-1,-80 0-15,0 0 16,80 0-1,-40 40-15,-1 0 16,41-40 0,-40 40-16,40-40 15,0 40 16,0-40-15,40 0-16,1 0 16,-1 0-1,0 0 1,0 0-16,-40 0 15,40 0 1,-40 0 0,0 0-1,0-40 1,0 40-16,0 0 15,-40 0 1,0 0-16,40 0 16,0 0-1,-40 40-15,40 0 31,0-40-31,0 40 16,0-40 0,0 0-16,40 0 15,0 0-15,0 0 16,0 0-1,-40 0 1,40 0 0,-40 0-16,0 0 15,0-40 1,0 0-16,0 40 31,0 0-31,-80 0 16,80 0-16,-40 0 15,40 0 1,-40 40-16,40-40 31,0 0 16,0 0-16,0 0 0</inkml:trace>
+  <inkml:trace contextRef="#ctx0" brushRef="#br0" timeOffset="286688.7921">19702 5695 0,'0'0'78,"0"0"-63,0 0 1,0 0-1,0 0 48,0 0-63,0 0 15,-40 0 1,40 40-16,0 0 16,0 0-1,0-40 1,0 40-1,0 0 1,0-40 15,0 0-31,40 0 31,-40-40-31,80 40 16,-40-80-16,1 40 16,-1-40-1,-40 40-15,0 0 16,0-1-1,0 41-15,0-40 16,0 40 0,0-40-16,-81 40 15,1 0 1,0 0-16,0 0 15,40 40-15,-81 41 16,121-81 0,-40 40-16,0 0 15,40 0 1,-40-40-16,40 40 15,0-40 1,0 40-16,0 0 31,40-40-31,0 0 16,0 40-16,40-40 15,-39 0 1,39 0-16,0 0 31,0 0-31,1 0 16,-41 0-1,0-40-15,-40 0 16,0 0 0,0 40-1,0 0-15,0-40 16,-40 40-1,-41 0-15,1 0 16,80 0 0,-40 40-16,0-40 15,40 40 1,-40 0-16,40-40 31,0 40-31,0-40 16,0 40 15,40-40-31,-40 0 15,40 0 1,0 0-16,0 0 16,-40 0-1,40 0-15,-40 0 16,41-40-1,-1 40-15,-40-40 16,0 0-16,0 40 16,0 0-1,-40 0-15,-1 0 16,41 0-1,-40 0-15,0 0 16,40 0 0,-40 40-16,40-40 15,0 40 1,0-40-16,0 40 15,0 0-15,0-40 16,40 41 0,0-41-16,0 0 15,1 0 1,-1 0-1,-40 0 1,80 0-16,-40-41 16,0 41-16,-40-40 15,0 40 1,0-80-16,0 80 15,0 0 1,-40-40-16,0 40 16,-40 0-1,80 0-15,-40 0 16,-1 0-1,41 0 1,0 40-16,0-40 16,0 40-1,0 0-15,0-40 31,41 0-31,-41 0 16,40 0 0,0 0-1,-40 0 1,0 0-1,40-40-15,-40 40 16,0-40 0,0 40-1,0-40 32,-40 40-47,0 0 0,40 0 16,-40 0-16,40 0 15,0 40 1,0-40-1,0 40 1,0-40 46,0 0-62,0 0 16,40 0-16,-40-40 16,40 40-1,-40-40-15,0 40 31,0-80-31,0 80 16,-40 0 0,40-40-16,-81 40 15,41 0 1,40 0-16,0 0 15,-40 0-15,40 40 32,0-40-32,0 40 15,0 0 1,0-40-1,0 0 1,40 0-16,-40 0 16,40 0-16,-40 0 31,0 0-31,0 0 15,0-40 1,0 40-16,0-40 31,0 40-31,-80 0 16,40 0-1,0 0-15,0 0 16,0 0-16,-41 40 16,81 40-1,0-40-15,0-40 16,0 40-1,0 0-15,0-40 16,0 0 0,41 41-16,-1-41 31,40 0-31,-80 0 15,80 0-15,-80 0 16,40-41 0,-40 1-16,0 40 15,0-40 1,0 40-16,0-40 31,0 40-31,-80 0 16,-40 0-16,39 40 15,41-40 1,-80 80-16,120-80 15,-40 81 1,40-81-16,0 40 16,0-40 30,80 0-30,0-40-16,1 0 31,-1-41-31,0 41 16,-80 0-1,40 0-15,-40 40 32,0-40-32,0 40 31,0-40-31,0 40 15</inkml:trace>
+  <inkml:trace contextRef="#ctx0" brushRef="#br0" timeOffset="296332.2329">12800 10347 0,'0'0'62,"0"0"-31,0 0-31,-40 0 16,40 40-1,0-40 1,0 40-16,0 0 16,0-40-1,0 40-15,0-40 16,0 0-1,80 0-15,-39 0 16,79 0-16,-40 0 16,0 0-1,-39 0 1,-1-40-1,-40 40-15,0-40 16,0 0 0,-40 0-16,-1 0 15,1 40 1,-80 0-16,40 0 15,-1 0 1,41 0-16,-40 0 16,80 0-16,-80 80 15,40-80 1,40 80-16,-40-80 15,40 0 1,0 40-16,0-40 31,0 41-15,40-41-16,0 0 15,-40 0 1,40 0-16,0 0 16,0 0-1,-40 0-15,40-41 16,0 41-1,-40-80-15,0 80 16,0-40 0,0 40-16,0-40 15,0 40-15,-40 0 16,-40 0-1,80 0-15,-40 0 16,0 0 0,0 80-16,40 0 15,0 1 1,0-41-16,0 0 15,0 0 1,0-40-16,0 40 16,40-40-1,40 0 1,40 0-16,1-80 15,-81 80 1,40-80 0,-80 80-1,0-40-15,0-1 16,0 1-16,0 0 15,-40 0 1,40 40-16,-40 0 16,-40 0-1,-1 0 1,41 0-1,0 40-15,0 0 16,40 0 0,-40 41-16,40-81 15,0 40-15,0-40 31,0 40-31,40-40 16,40 0 0,-40 0-16,1 0 15,39-80 1,-80 80-16,80-81 15,-80 41 1,0-80-16,0 80 16,-40 0-1,0 0-15,0 0 16,-41 40-16,41 0 15,0 0 1,-40 0-16,80 40 16,-40-40-1,40 40-15,0-40 16,0 40-1,0-40-15,0 40 32,0 0-32,0-40 15,40 40-15,0-40 16,40 0-1,-40 0-15,-40 0 16,41 0 0,-41-40-16,0 0 15,0 0 1,0 40-16,0-40 15,0 40 1,-41 0 0,1 0-16,0 0 15,-40 0 1,80 40-16,-80 40 15,80-40 1,0 40-16,0-80 16,0 41-1,0-41-15,0 0 16,0 0-16,80 0 15,0 0 1,-40 0-16,0 0 16,-40 0-1,41 0-15,-41-41 16,0 41-1,0-40 1,0 40 15,0 0-31,-41 0 16,1 0-1,40 0-15,0 40 16,-40-40 0</inkml:trace>
+  <inkml:trace contextRef="#ctx0" brushRef="#br0" timeOffset="306194.1139">18819 5815 0,'0'0'31,"0"0"109,0-40-124,0 40 0,0-40-1,0 40-15,0 0 16,-40-40-1,0 40-15,0 0 16,40 0 0,-40 0-16,0 0 31,40 0-31,-40 40 15,40 0 1,0-40-16,0 40 16,0-40-1,0 40 1,0-40-1,0 0 1,80 0-16,-40 0 16,0-40-1,-40 40-15,40-40 16,-40-40-16,0 40 15,-40-40 1,-40 80-16,-41-41 16,41 41-1,0 0-15,-40 0 16,39 41-1,41 39-15,0-80 16,40 40 0,-40-40-16,40 40 15,0 0 1,0-40-1,0 0 1,80 0 0,-40 0-16,81 0 15,-81-80 1,0 80-16,-40-40 15,0 0 1,0 0-16,0 40 16,0-41-16,0 41 31,0 0-31,-40 0 15,-40 121 1,80-81-16,-81 40 16,41 0-1,40-40 1,0 0-16,0 1 15,0-1 1,0-40-16,0 0 16,40 0-1,0 0-15,81 0 16,-1-40-1,-80-41-15,0 41 16,1 0 0,-41-40-16,0 80 15,0-80-15,0 80 31,0-40-31,-41 40 16,-39 0 0,0 0-16,0 0 15,40 0 16,-41 40-31,81-40 16,0 40 0,0-40-1,40 0 1,-40 0-16,41 0 15,39 0 1,-40 0-16,0 0 16,40 0-1,-40 0-15,1-40 16,-1 0-16,-40 0 15,0 40 1,-40-41-16,-41 1 16,1 40-1,0 0-15,0 0 16,-1 0-1,41 40-15,0-40 32,40 41-32,0-41 15,0 40-15,0 0 16,0-40-1,0 40-15,0-40 16,0 40 0,80 0-16,41-40 15,-81 0 1,40 0-16,0 0 15,-40 0 1,-40-40-16,41 40 16,-41-40-1,0 40 1,0-40-16,0 40 15,-41 0 1,-39 0-16,40 0 16,0 40-1,-40 40-15,40-40 16,40 0-16,-41 0 15,41 0 1,0-40-16,0 41 16,0-41-1,0 40-15,0-40 16,81 0-1,-1 0-15,-40 0 16,0 0 0,40-40-16,-80-1 15,41 1 1,-41 0-1,0 0-15,0 40 16,0-40 0,0 40-16,-41 0 15,-39 0 1,80 0-1,-40 0 1,0 40-16,0 0 16,40-40-16,0 40 15,0 0 1,0-40-16,0 41 15,0-41 1,40 40-16,120 0 16,-79-40-1,-1 0-15,0 0 16,-40-40-16,0 0 15,-40-1 1,0 41 0,0-40-1,0 40-15</inkml:trace>
+  <inkml:trace contextRef="#ctx0" brushRef="#br1" timeOffset="322311.606">16251 6898 0,'0'0'78,"40"0"-63,-40 0-15,40 0 16,-40 0-1,41 0-15,-41 0 16,0-40-16,0 40 31,0 0-15,0 0-1,-41 40-15,-39 40 16,0 0 0,40 1-16,0 39 15,40-80 1,-40 80-16,40-80 15,0-40-15,0 41 16,0-1 0,0-40-1,40 0 1,80 0-16,-40-40 15,41-41 1,-41 1-16,-40 0 16,-40 40-1,0-40-15,0 40 16,0-41-16,0 81 15,-40 0 1,-40 0-16,40 0 16,40 0-1,-81 0-15,1 0 16,40 0-1,-40 0-15,80 81 16,-40-81-16,40 0 31,0 40-31,0-40 31,0 0-15,80 0 0,-40 0-16,40 0 15,-40 0 1,0-40-16,-40 40 15,41-41-15,-41-39 16,0 40 0,0 0-16,-41 0 15,-79 0 1,40 40-16,40 0 15,0 0 1,-41 0-16,81 0 16,-40 0-1,40 0 1,0 40-16,0 0 15,0-40 1,0 40 15,40-40-31,0 0 16,41 0-1,-81 0-15,40 0 16,0 0-16,-40-40 16,40 0-1,-40 40-15,0-40 16,0 40 15,0 0-15,-40 0 15,40 0-31,-40 40 15,40 0-15,0-40 16,0 80 0,0-80-16,0 40 31,0-40-16,40 0 1,0 0-16,40 0 16,41 0-1,-41 0-15,-40-80 16,-40 80-16,40-40 15,-40 0 1,0 0-16,0 40 16,-40-40-1,-40 0-15,0 40 16,-41 0-1,81 0-15,0 40 16,0-40-16,0 0 16,40 40-1,0 0-15,0-40 16,0 40-1,0-40 1,40 0 0,0 0-16,-40 0 15,40 0 1,0 0-16,-40 0 15,40 0-15,0 0 32,-40 0-32,0 0 31,0 0 0,0 0-31,-40 0 16,0 0-1,0 0-15,40 0 16,0 80-16,0-40 15,0 0 1,0-40-16,0 41 31,40-41-31,-40 0 16,40 0-1,0 0-15,1 0 32,-1 0-32,0 0 15,0-41-15,0 1 16,-40 0-1,0 0-15,0 40 16,0-40 0,-40 40-16,0 0 15,-40 0 1,39 0-16,1 0 15,0 0 1,40 80-16,-40-80 16,40 40-16,0-40 15,0 40 1,0 1-16,0-41 15,0 0 1,0 0-16,80 0 16,-80 0-1,40 0-15,-40 0 16,41 0-1,-41 0 1,0-41 15</inkml:trace>
+  <inkml:trace contextRef="#ctx0" brushRef="#br0" timeOffset="334659.4987">17495 6778 0,'0'-40'187,"0"40"-171,-40 0 0,0 0-1,40 0-15,0 0 16,-40 0-16,40 80 15,0-80 1,0 40-16,0 0 16,0 0-1,0-40 1,40 0-1,80 0 1,1 0-16,-1-80 16,-40 0-1,0-1-15,-39 41 16,-41 0-1,0 40-15,0-40 16,-81 40 0,1 0-16,-40 0 15,39 0 1,1 0-16,0 80 15,0 1-15,-1 39 16,41-80 0,-40 40-16,80-40 15,-40 0 1,0 1-16,40-41 15,0 40 1,0-40 15,40 0-31,0 0 16,0 0-16,0 0 31,-40 0-15,0-40-1,0 40-15,0-41 16,0 41-1,0-40-15,0 0 32,0 40-17,0 0-15,-80 0 16,80 0-1,0 40 1,0 0-16,0-40 16,0 41-1,0-41 16,40 0-31,0 0 16,41 0 0,-41 0-16,0-41 15,40 41 1,-40-80-16,-40 80 15,0-40 1,0 40 0,0-40-1,0 40-15,-40 0 16,0 0-16,0 0 15,40 0 1,-40 40-16,40 0 16,-40 0-1,40-40 1,0 40-1,0 1-15,0-41 32,40 0-17,40 0-15,0 0 16,-40-81-1,41 81-15,-41-80 16,-40 80 0,0-40-16,0 40 15,0-40 1,0 0-16,0 40 15,-81-40-15,41 40 16,0 0 0,0 0-16,0 0 15,0 0 1,40 0-16,0 0 15,-40 40 1,40-40 15,0 40-31,0 0 16,0-40-16,0 0 15,40 0 1,0 0-16,40 0 16,-40 0-1,0 0-15,1-40 16,-1 0-1,-40 40-15,0-40 16,0 40-16,-40-40 16,-41 40-1,41 0-15,0 0 16,-40 0-1,80 0-15,-40 0 16,40 40 0,-40-40-16,40 40 15,0 0 1,0-40-16,0 40 15,0-40-15,40 0 16,0 0 0,0 0-16,40 0 15,-40 0 16,0 0-31,-40 0 16,0-40 0,0 40-1,0-40-15,0 40 16,-40 0-16,0 0 15,40 0 1,-40 0 0</inkml:trace>
+  <inkml:trace contextRef="#ctx0" brushRef="#br1" timeOffset="343930.1879">15248 7058 0,'0'-40'15,"0"40"1,0-40-16,0 40 16,-40-80-1,0 80-15,40-40 16,0 40-1,-40 0-15,40 0 16,-81 0-16,81 0 16,-40 80-1,0 40-15,40-39 16,0 39-1,0-80-15,0 0 16,0 40 15,40-80-31,0 40 16,1-40-16,79 0 15,0-80-15,-39 0 16,-1 0 0,0 0-16,-80-1 15,0 81 1,0-40-16,0 0 15,-40 40 1,-40-40-16,-1 40 16,1 0-1,0 0-15,40 0 16,-40 0-16,39 40 15,1-40 1,40 40-16,-40-40 16,40 40-1,0 1 1,0-41 31,40 0-32,-40 0 1,0-41-1,0 41-15,0-40 32,0 40-32,0-40 15,0 40 16,0 0-15,-40 0 0,40 0-1,0 40 1,0-40-16,0 40 15,40 1 1,-40-1 0,81-40-1,-1 0-15,40 0 16,-80 0-16,-40 0 15,40 0 1,1 0-16,-41-81 16,0 81-1,0-40-15,0 40 16,-81-40-1,1 0-15,0 40 16,-41 0-16,81 0 16,0 0-1,0 0-15,40 0 16,0 0-1,0 0-15,0 40 47,0 0-31,40-40-1,0 0-15,0 0 16,1 0 0,-1 0-16,0 0 15,-40 0 1,80-40-16,-80 0 15,0 40 1,0-40-16,0 0 16,0 0-1,-40 40-15,0-40 16,0 40-1,40 0 1,-40 0-16,40 0 16,-41 40-1,41-40-15,0 40 16,0-40-1,0 40-15,0 0 16,0-40-16,0 40 31,81-40-31,-41 0 16,0 0-1,-40 0-15,40 0 16,0-40 0,0 0-16,-40 0 15,0 40 1,0-40-16,0 0 15,-40 40-15,0 0 16,40 0 0,-80 0-16,80 0 15,-40 0 1,0 40-16,-1 0 15,41 0 1,0-40-16,0 40 16,0-40 15,41 0-16,-41 0 1,40 0-16,-40 0 16,80 0-1,-80 0-15,40 0 16,-40 0 15,0 0-15,-40-40-1,0 40-15,0 0 16,-41 0-1,1 40-15,40 0 16,40 0 0,-40 0-16,40-40 31,0 41-31,40-41 47,-40 0-47,40 0 15,40 0 1,-80 0-16,41 0 15,-1-41 1,0 1-16,-40 40 16,0 0-1,0-40-15,0 40 16,0-40-16,0 40 31,-40 0-31,40 0 16,-40 0-1,40 40-15,-41-40 16,41 40-1,0 0 1,0-40 0,0 0 15,81 0-16,-81 0-15,80 0 16,0 0 0,-40-40-1,0 0 1,-40 40-16,41-40 15,-41 0-15,0 0 16,0 0 0,-41 0-16,-39 40 15,40 0 1,-40 0-16,40 0 15,0 0 1,-1 0-16,1 40 16,40-40-1,0 40 1,0-40-16,40 0 31,-40 40-31,41-40 16,-1 0-1,0 0-15,0 0 16,-40 0-1,40 0-15,0 0 16,-40 0-16,0-40 16,0 40-1,0-40 1,0 40 15,-40 0-15,40 0-16,-40 0 15,40 0 1,-40 40-16,40-40 31,0 40-15,0 0 15,0-40-31,0 0 31,40 0-15,-40 0-1</inkml:trace>
+  <inkml:trace contextRef="#ctx0" brushRef="#br1" timeOffset="356952.4403">13803 6898 0,'0'-40'31,"0"40"-31,0-40 0,0 0 16,0 0-1,0 40-15,0-41 16,0 1-16,0 40 16,0 0-1,0 0-15,-40 0 16,0 0-1,0 40-15,40-40 16,0 41 0,0-1-16,0 0 15,0-40 1,40 0-16,-40 40 15,40-40-15,-40 0 16,40 0 0,-40 0-1,0 0 1,0 0 15,0 0 0,0 0-31,-80 0 16,80 0-16,-80 0 15,80 0 1,0 0-16,0 40 16,0-40-1,0 40 1,0 0 15,0-40 0,40 0-31,-40 0 16,40 0-1,0 0-15,0 0 16,-40-40 0,41 0-16,-41 40 15,0-40 1,0 0-16,0 40 15,0-40-15,0 40 16,0 0 0,-41 0-16,41 40 31,-40 0-31,40 0 15,0 40 1,0-80-16,0 40 16,0 81-1,0-81-15,81 0 16,-81-40-16,80 40 15,40-40 1,1 0-16,-81 0 16,-40 0-1,40-40-15,-40 0 16,0-81-1,0 41-15,0-40 16,-121 40-16,81-1 16,-40 1-1,0 40-15,40 40 16,-81-40-1,81 40-15,0 0 16,-40 0 0,80 0-16,-40 40 31,40 0-31,0 0 15,0 0 1,0 1 0,0-41-16,0 40 15,80-40 1,-40 40-16,40 0 15,41 0 1,-41-40-16,-40 0 16,40 0-1,-40 0-15,1 0 16,-1-40-16,0-40 15,-40 80 1,0-40-16,0-1 16,-40 1-1,0 40-15,-41 0 16,41 0-1,40 0-15,-40 0 16,40 0-16,-40 0 16,40 40-1,-40-40-15,40 41 16,0-1-1,0-40-15,0 40 16,0-40 0,40 0-16,40 0 15,0 0 1,1 0-16,-41 0 15,0 0-15,0-80 16,-40 80 0,0-41 15,0 1-31,-80 40 0,0 0 15,-41 0 1,1 81-16,80-1 16,0 0-1,-1 0 1,41 0-16,0-39 15,0-1 1,0 0-16,0-40 16,0 40-1,0-40-15,41 0 31,-1 0-31,0 0 16,40 0-16,0-40 16,-40 0-1,41-41-15,-81 1 16,0 40-1,0-40-15,0 80 16,0-40 0,-121 0-16,81 40 15,0 0 1,-40 0-16,40 0 15,-41 0-15,41 0 16,0 80 0,40-40-16,-40 0 15,40-40 1,0 40-16,0-40 15,0 40 1,0-40-16,0 0 16,80 40-1,-40-40-15,1 0 16,39 0-16,40 0 15,-80 0 1,41-40-16,-1 0 16,-80-40-1,0 40-15,0 0 16,0 0-1,0 40-15,-40-40 16,0 40-16,-41 0 31,41 0-31,40 0 16,-40 0-1,40 0-15,-40 40 16,40-40 0,0 40-16,0-40 31,0 80-31,40-80 15,40 0-15,-40 0 16,1 0 0,39 0-16,-80 0 15,40 0 1,-40 0-1,0 0 32,0 0-16</inkml:trace>
+  <inkml:trace contextRef="#ctx0" brushRef="#br1" timeOffset="369462.6604">13081 7058 0,'0'0'15,"0"-40"1,0 40 15,0-40 0,-40 40-15,0 0 15,-40 0-31,40 0 16,-1 0-1,-39 0-15,40 0 16,0 0-16,40 0 15,0 40 1,0 0-16,0-40 16,0 41-1,0-41-15,0 40 16,0 0-1,40-40-15,-40 0 16,80 40 0,-80-40-16,40 0 15,1 0-15,-1 0 16,40-40-1,-40 0-15,-40 0 16,0-41 0,0 1-16,0 0 15,0 40 1,0-40-16,0 39 15,-80-39 1,40 80-16,-41-40 16,-39 40-16,80 0 15,0 0 1,-40 0-16,39 0 15,41 0 1,0 40-16,-40-40 16,40 80-1,0-80 1,0 41-16,0-41 31,0 40-31,40 0 16,-40-40-1,81 0 1,39 0-16,-40 0 15,1-80-15,-1-1 16,-80 41 0,80-40-16,-80 40 31,0 0-31,0 0 15,0 40-15,-40-40 16,-40 40 0,-1 0-16,1 0 15,40 0 1,-40 40-16,40 0 15,0 0 1,40 0-16,-41 0 16,41-40-1,0 40-15,0 0 16,0 0-16,0-40 15,0 81 1,41-81-16,-1 40 16,0 0-1,40-40-15,-40 0 16,0 0-1,-40 0-15,81 0 16,-41 0-16,-40 0 16,40 0-1,0-40 16,-40 40-31,0-40 16,0 40 0,-40 0-1,0 0 1,0 40-16,-1 0 15,41 0-15,0 0 16,-40-40 0,0 80-16,40-80 15,0 40 1,0 1-1,0-41 1,0 40 0,40-40-1,0 0-15,1 0 16,-1 0-16,-40 0 15,80-40 1,-80-1-16,0 1 16,0-40-1,0 40-15,0 0 16,0 0-1,0 40-15,-40-40 16,-40 40-16,39 0 16,-39 0-1,0 0-15,40 0 16,40 0-1,-40 0-15,0 0 16,40 40 0,0-40-16,0 40 15,0 0 1,0-40-16,0 40 15,40 0-15,40 40 16,0-80 0,0 41-16,1-1 15,-41-40 1,0 0-16,0 0 15,0 0 1,40 0-16,-80-40 16,0-1-1,0 1-15,0-40 16,-80 80-16,0-40 15,-40 0 1,79 0-16,-39 40 16,0 0-1,40 0-15,0 40 16,40 0-1,-40 40 1,40-80-16,0 40 16,0-40-1,0 40-15,0 1 16,40-41-1,-40 0-15,40 40 16,0-40 0,40 0-16,0 0 15,-80 0 1,41 0-16,-1-40 15,-40-1-15,40-39 16,-40 80 0,0-40-16,0 0 15,-80 40 1,-1 0-16,41 0 15,0 0 1,-40 0-16,80 0 31,-40 40-31,40 0 16,0 0-16,0 0 0,0-40 15,0 81 1,40-81-16,0 40 16,-40-40-1,40 40-15,40-40 16,-40 0-1,41 0-15,-1-40 16,-80 0-16,40-41 16,0 41-1,0 0-15,-40-40 16,0 40-1,0 0-15,-40 0 16,0 0 0,0 40-16,-80 0 15,39 0 1,41 0-1,-40 40-15,80-40 16,-80 80 0,80-80-16,0 40 15,0-40 1,0 40-1,0 0 1,0-40 0,40 0-1,0 0-15,-40 0 16,40 0-16,0 0 15,0 0 1,-40 0 0,40 0-1,-40 0 16,0 0 47,41 0-15,-41 0-48</inkml:trace>
+  <inkml:trace contextRef="#ctx0" brushRef="#br1" timeOffset="375546.926">12118 6858 0,'0'0'109,"-40"0"-77,0 0-17,0 0 1,40 0-16,-40 0 15,0 0-15,-1 0 16,-39 0 0,80 0-16,-40 0 15,40 0 1,0 0-16,-40 0 15,40 0 1,0 40 15,0-40-15,0 0-1,40 0 1,-40 0 0,40 0-1,-40 0-15,0 0 16,0-40-1,0 40-15,0-40 16,0 0-16,-40 40 16,0 0-1,0 0-15,40 0 16,-40 0-1,0 0-15,-1 0 16,41 0 0,0 40-16,-40 0 15,40-40 1,0 40-1,0 0-15,0-40 16,0 0 0,0 40-16,0-40 31,0 0-16,40 0 1,-40-40 15,0 40-31,0-40 16,0 0-16,0 0 15,0 40 1,0 0-16,0-40 16,0 40-1,-40 0-15,40 0 31,-40 0-31,40 0 16,0 40-16,0 0 16,0-40-1,0 40 1,0-40-1,0 40-15,40-40 16,41 0 0,-41 40-16,0-40 15,40 0 1,-80 0-16,40 0 15,0 0 1,-40 0 0,40-40-16,-40 40 15,0-40 1,-40 40-16,0 0 15,0 0 1,40 0-16,-40 0 16,0 0-1,40 0-15,0 0 16,0 0-16,0 40 15,0 0 17,0-40-17,0 40-15,0-40 16,40 40-1,40-40-15,-40 0 16,0 0-16,1 0 16,-41 0-1,40 0-15,-40-40 16,0 40-1,0-80-15,0 80 16,0-40 0,0 40-16,0-40 15,-81 40 1,41 0-16,-40 0 15,0 0-15,80 0 16,-40 40 0,40 0-16,-40-40 15,40 40 1,0 0-16,0 0 15,0 1 1,0-41-16,0 40 16,40-40-1,-40 40-15,80-40 16,-40 0-16,0 0 15,-40 0 1,40 0-16,-40 0 16,40-40-1,-40 0-15,0-1 16,0 1-1,0 0-15,-40 0 16,0 40-16,0 0 16,0 0-1,40 0-15,-40 0 16,0 0 15,40 0-15,-40 40-16,40-40 15,0 40 1,0-40-16,0 40 15,40-40 1,-40 0 0,40 0-16,40 0 15,-40 0 1,0 0-16,-40-40 15,81 0 1,-81 40-16,0-80 16,0 40-1,0 0-15,-41 0 16,-39 0-16,40 40 15,-40-41 1,40 41-16,0 0 31,-1 0-31,1 0 16,0 0-1,40 41-15,-40-1 16,40 0-16,0 0 16,0 0-1,0-40 1,40 80-1,0-80-15,0 0 16,1 0 0,-1 0-16,-40 0 15,40 0 1,40 0-16,-80-80 15,0 40-15,0 40 16,0-40 0,0 0-16,0 0 31,0 40-31,-80-41 15,40 41 1,0 0-16,-1 41 16,1-41-1,40 40-15,-40 0 16,40-40-16,0 40 15,0-40 1,0 40 0,0-40-1,0 0-15,80 0 16,-39 0-1,-41 0-15,80 0 16,-80 0-16,40-40 16,-40 0-1,0 40-15,0-40 16,0 40-1,0-40-15,-80 40 16,40 0 0,-1 0-16,1 0 15,0 0 1,0 0-16,40 0 15,0 40-15,0-40 16,0 40 0,0 0-1,0-40 1,40 40-16,0 0 15,0-40 1,41 0-16,-41 0 16,0 0-1,-40 0-15,40-40 16,-40 40-16,0-40 15,40 40 1,-40-40-16,0 0 31,0 40 16,0 0-16</inkml:trace>
+  <inkml:trace contextRef="#ctx0" brushRef="#br1" timeOffset="378463.8063">3852 15039 0,'0'0'62,"0"0"-46,0 0-1,40 40 1,41 1-16,39-1 16,121 0-1,120 40 1,160 0-1,322 41-15,642 39 16,441-40-16,-642-40 16,-361 1-1,-361-81-15,-161 0 16,-80 0-1,-161 0-15,41 0 16,-121 0 0,0 0-16,-39 0 15,-1 0 1,0 0-16,-40 0 15,0 0 110,0 0-125,-40-40 16,-81 40-16,-39-41 15,-121-39 1,-120-80 0,-41 80-1,-119-41-15,79-39 16,0 40-1,121 79-15,0-39 16,80 40-16,0-40 16,-40 40-1,81 0-15,-81 0 16,80 40-1,-40-40-15,40 40 16,81 0 0,-1-41-16,41 41 15,-41 0 1,41 0-16,0 0 15,39 0-15,41 0 16,0 0 0,0 0-16,0 0 15,40 0 1,0 0 15,40 0-15,120 0-1,41 0-15,241 0 16,-1 0-16,40 0 15,-200 0 1,0 0-16,-160-40 16,-1 40-1,-40-40-15,-40 40 16,-80 0 15,-160 0-15,-202 0-1,-159 121 1,-81-121-16,-442 120 15,-80 80 1,81-79 0,240-1-16,241-80 15,241 0 1,80-40-16,161 0 15,40 0 1,120 0 0,80-80-1,121 40 1,80-40-16,120 40 15,161-1 1,281-79-16,-80 80 16,120 0-1,-362-40-15,-79 40 16,-161 40-16,-80 0 15,-201 0 1,40 0-16,-80 0 62,-40 0-62,-121 40 16,-160 40-16,40-80 16,-40 40-1,81-40-15,-81 40 16,80 0-1,0 0-15,81-40 16,120 40 0,-41-40-16,41 0 15,80 0 16,41 0-15,119 0 0,161 0-16,121 0 15,200 41 1,-80-41-1,-161 40 1,-39 0-16,-242-40 16,-40 40-1,-39-40-15,-41 0 16,0 0-16,-40 0 31,-80 0-31,-41 0 16,-200 0-1,40-40-15,-240 0 16,160 40-1,-81 0-15,121 0 16,-80 0-16,200 0 16,-39 0-1,159 0-15,1 0 16,80-40 15,40 40-15,161-41-16,-1 1 15,242 0 1,79 0-16,1 40 15,-80 0-15,-121 0 16,-41 0 0,-119 0-16,-81 0 15,0 0 1,-160 0 15,-161 0-15</inkml:trace>
+  <inkml:trace contextRef="#ctx0" brushRef="#br0" timeOffset="395624.4013">19542 4452 0,'0'40'31,"40"-40"-31,0 0 16,-40 40-16,40-40 16,-40 0-1,80 0-15,-40 0 16,-40 0-1,40 0-15,1-40 16,-41 40 0,0-40-1,0 40-15,-41 0 16,-39 0-1,40 0-15,-40 40 16,40-40 0,40 40-16,-40-40 15,40 40 1,0 0-1,0 0 1,40-40 15,0 0-15,40 0-16,40 0 15,-79-80 1,39 80-16,-80-80 16,40 80-1,-40-40-15,0 40 16,0-41-1,0 1-15,-40 40 16,-40 0-16,-1 0 16,41 0-1,0 40-15,-40 1 16,80-1-1,-40 0-15,40 0 16,0 0 0,0 0-16,0-40 15,0 40 1,0-40-1,40 0-15,0 0 16,0 0 0,80 0-16,1 0 15,-1-40 1,-80 0-16,0-40 15,-40 80 1,0-80-16,0 39 16,-40 1-16,0 40 15,-40 0 1,40 0-16,0 0 15,-41 40 1,41 1-16,0-1 16,0 0-1,40 0-15,0 40 16,0-40-1,0 0 1,0-40-16,40 40 31,-40-40-31,40 0 16,-40 0-1,81 0-15,-81 0 16,40 0 0,-40 0-16,40 0 15,-40 0-15,0 0 31,0-40-31,0 40 16,-121 0 0,41 0-16,0 0 15,40 0 1,-40 40-16,80-40 15,0 81 1,0-81-16,0 40 16,0-40-16,0 40 31,0-40-16,80 0 1,-40 0-16,40-40 16,0 40-1,-39 0-15,-41-80 16,40 80-1,-40-41-15,0 41 16,0-40 0,0 40 15</inkml:trace>
+  <inkml:trace contextRef="#ctx0" brushRef="#br1" timeOffset="413662.1292">12680 11510 0,'0'0'63,"0"0"-48,40 0 1,-40 0 0,40 0-16,-40-40 31,40 40-16,-40 0 48,0 0-48,0 40 1,0 0-16,40 0 16,-40-40-16,0 40 15,81-40 1,-81 41-1,40-41 1,40 0-16,-40 0 16,0 0-1,0 0-15,1-41 16,-41 41-16,0 0 15,0-40 1,0 0-16,0 0 16,-121 0-1,81 40-15,-40 0 16,0 0-1,-1 0-15,41 0 16,0 40 0,0-40-16,0 40 15,40 0-15,-40 0 16,40-40-1,0 41 1,0-1 0,0-40-16,40 0 15,40 0 1,40 40-16,1-40 15,79 0 1,-79 0-16,-41 0 16,0-40-16,1 0 15,-41-1 1,-40-39-16,0 40 15,0 0 1,0 0-16,0 40 16,-40-40-1,-41 0-15,1 40 16,40 0-16,-40 0 15,40 40 1,-121 40 0,121 0-16,0 41 15,0-81 1,0 40-1,-1 0-15,41-40 16,0 0 0,0 0-16,0-40 15,0 40 16,0-40-31,41 0 16,-1 0 0,0 0-16,0 0 15,0 0 1,-40 0-16,0-40 15,0 0 1,0 0-16,0 0 16,0 0-16,-40 0 15,0 0 1,-40 40-16,39 0 15,41 0 17,-40 0-32,40 0 15,-40 0-15,40 0 16,-40 0-16,40 0 15,0 40 1,0-40 15,0 0-31,0 0 16,40 0-1,0 0-15,0 0 16,1 0 0,-41-40-16,40 40 15,0-40-15,-40 0 16,0-1-1,0 1-15,-40 0 32,0 40-32,-1 0 15,1 0 1,40 0-16,-80 0 15,40 0 1,0 0-16,40 0 16,-40 40-16,40-40 15,0 40 1,0-40-16,0 41 31,0-41-31,0 0 31,80 0-31,-40 0 16,40 0-16,1 0 15,-41 0 1,0-41-16,0 1 16,-40-40-1,0 0-15,0 40 16,0 0-1,0 0-15,-40 40 16,0-41 0,0 1-16,-41 40 15,81 0-15,-80 0 16,40 40 0,-40 1-16,80-1 15,-40 80 1,-1-80-16,41 0 15,0 0 1,0 0-16,0-40 16,0 41-1,41-41-15,39 40 16,-40-40-16,40 0 15,0 0 1,1-40-16,-41-1 31,0 1-31,-40 0 16,0 40-1,0-80-15,0 80 16,0-40-16,0 40 31</inkml:trace>
+  <inkml:trace contextRef="#ctx0" brushRef="#br1" timeOffset="423654.5184">12600 12673 0,'0'0'31,"40"0"-31,0 0 31,-40-40-31,0 40 16,0-40-1,0 40 32,0 0-47,-40 40 16,0-40-1,40 40-15,-40-40 16,40 40-1,0 0 1,0-40 0,0 40-1,40-40 1,80 0-1,-40 0 1,-40 0 0,81 0-16,-81-40 15,0 0 1,-40 0-16,40 0 15,0 0-15,-40-40 16,0 80 0,0-40-16,-40 0 15,-40 40 1,0 0-16,40 0 15,-41 0 1,41 0-16,0 40 16,40 0-1,0 0-15,0 0 16,0-40-1,0 40 1,0-40 15,40 0-31,-40 0 16,40 0-1,-40 0-15,81 0 16,-81 0-16,0-40 16,0 40-1,0-40 1,-41 40-1,1 0-15,0 0 16,-40 40 0,40 0-16,-40 0 15,80 0 16,0 0-31,0 0 16,0-40-16,0 41 16,0-1-16,0-40 31,80 0-31,40 0 15,41 0 1,-81 0-16,0 0 16,0 0-1,-39-40-15,-1 40 16,-40-81-16,0 81 31,0-40-31,0 40 16,-40 0-1,-1 0-15,1 0 16,0 0-1,0 0-15,0 40 16,40 0 0,0-40-16,-40 41 15,40-41-15,0 40 16,0-40 15,0 0-15,80 0-16,-80 0 15,40 0 1,-40 0-16,0-81 31,0 81-31,0-40 16,-40 40-16,0-40 15,0 40 1,-81 0-16,81 0 15,-40 0 1,40 0-16,40 0 16,0 40-1,-40-40-15,40 40 16,0-40-1,0 41-15,0-41 32,0 0-17,40 0-15,0 0 16,40 0-1,-40-41 1,1 1 0,-41 0-16,0 0 15,0 0 1,0 40-1,-41 0-15,1 0 16,0 0 0,-40 40-16,40 0 15,0 0 1,40 0-16,0-40 15,0 41 1,0-1 0,0-40-16,40 0 15,0 0 1,40 0-16,41 0 15,-41-40 1,0-1-16,-40 1 16,-40-40-1,0 40-15,0 40 16,-40 0-1,-120 0-15,39 0 32,-39 0-32,-41 40 15,81 40-15,39-40 0,81 41 16,-40-41-1,0 0-15,40-40 32</inkml:trace>
+  <inkml:trace contextRef="#ctx0" brushRef="#br1" timeOffset="425686.0206">5297 5735 0,'120'0'31,"41"40"-31,280 0 0,161-40 16,401 0 0,321 0-16,-441 0 15,-161-40-15,-160 40 16,-201 0-1,-120 0-15,-201 0 16,-40 0 0,0 40-16,-160 40 15,-202 41 16,-119-41-31,-121 0 16,-241-40-16,-962 121 16,440-121-16,322 40 15,562-40 1,481-40 46,160-120-46,81-1-1,40 1-15,-41 40 16,-39 40-16,80-40 16,-161-1-1,-80 81-15,-40-40 16,0 0-1,-120-80-15,-40 80 32,-242-40-32,81-41 15,-200-39-15,160-41 16,40 41-1,0-1-15,240 121 16,41-40 0,0 80-16,40-40 15,0 40 1,80 0-16,81 0 15,120 0 1,160 0-16,321 0 16,-160 0-16,-80 0 15,-241 0 1,-121 0-16,-120 0 15,-40 0 1,-200 0 0,-1 0-1,-200 0-15,40 0 16,-40 120-1,-41 1-15,81-41 16,160 40-16,81-40 16,80-40-1,40 1-15,0 39 16,0-80-1,201 0-15,79 0 16,282 0 0,80 0-16,281 0 15,-361 0-15,-121 0 16,-240 0-1,-81 0-15,-120 0 16,0 0 0,-160 0-1,-121 0 1,-161 0-1,121-40 1,-120 0-16,160-1 16,0 1-16,161 40 15,0-40 1,39 40-16,81 0 15,0-40 1,201 0-16,120 0 16,361-80-1,-120 39-15,0 81 16,-201 0-1,-120 0-15,-201 0 16,0 0 0</inkml:trace>
+</inkml:ink>
+</file>
+
+<file path=ppt/ink/ink2.xml><?xml version="1.0" encoding="utf-8"?>
+<inkml:ink xmlns:inkml="http://www.w3.org/2003/InkML">
+  <inkml:definitions>
+    <inkml:context xml:id="ctx0">
+      <inkml:inkSource xml:id="inkSrc0">
+        <inkml:traceFormat>
+          <inkml:channel name="X" type="integer" max="3286" units="cm"/>
+          <inkml:channel name="Y" type="integer" max="1080" units="cm"/>
+          <inkml:channel name="T" type="integer" max="2.14748E9" units="dev"/>
+        </inkml:traceFormat>
+        <inkml:channelProperties>
+          <inkml:channelProperty channel="X" name="resolution" value="68.17427" units="1/cm"/>
+          <inkml:channelProperty channel="Y" name="resolution" value="39.8524" units="1/cm"/>
+          <inkml:channelProperty channel="T" name="resolution" value="1" units="1/dev"/>
+        </inkml:channelProperties>
+      </inkml:inkSource>
+      <inkml:timestamp xml:id="ts0" timeString="2018-01-22T23:34:29.543"/>
+    </inkml:context>
+    <inkml:brush xml:id="br0">
+      <inkml:brushProperty name="width" value="0.05292" units="cm"/>
+      <inkml:brushProperty name="height" value="0.05292" units="cm"/>
+      <inkml:brushProperty name="color" value="#FF0000"/>
+    </inkml:brush>
+  </inkml:definitions>
+  <inkml:trace contextRef="#ctx0" brushRef="#br0">16532 13596 0,'0'0'109,"0"0"31,0 0-124,0 0 15,-40 0-15,0 0 15,40 0-16,0 0 17,0 0 108,0 0-31,0 40-93,0-40-16,40 0 15,0 40 1,-40-40-16,40 0 16,0 0-1,0 40-15,1-40 16,-41 40-1,40-40-15,0 0 16,0 0 0,-80 0 46,40 0-46,-40 0-16,40 0 31,-81-40-31,81 40 15,-40 0 1,0-40 0,40 40 15,-40 0-31,40-40 31,0 40 0,-40 0-31,40-40 31,0-1 47</inkml:trace>
+  <inkml:trace contextRef="#ctx0" brushRef="#br0" timeOffset="1290.1032">15730 12473 0,'-41'0'62,"41"0"-62,0 40 16,-40 0 0,40 0-16,0-40 15,0 80 1,-40 0-16,40-40 15,0-40-15,0 41 16,0-1 0,0 0-16,0-40 31,0 40-31,0 0 15,0-40 1,0 40-16,0-40 31,0 0-15,40 40-1,-40-40 1,40 0 15,-40 0 0,41 0 1,-41 0-17,40 0 1,0 0-1,-40 0 17</inkml:trace>
+  <inkml:trace contextRef="#ctx0" brushRef="#br0" timeOffset="2121.1697">16051 12553 0,'0'0'32,"0"0"-1,0 0-16,0 40-15,0 0 16,0-40 0,0 40-16,0 0 15,0 0 1,0 0-16,0-40 15,0 41 1,0-1-16,0-40 31,0 40 0</inkml:trace>
+  <inkml:trace contextRef="#ctx0" brushRef="#br0" timeOffset="3011.2408">16211 12553 0,'0'0'62,"0"0"-46,0 40-16,0 0 16,0 0-1,0 0-15,0 0 16,0 0-1,0-40-15,0 41 16,0-1-16,0-40 16,0 40-1,0-40-15,0 40 31</inkml:trace>
+  <inkml:trace contextRef="#ctx0" brushRef="#br0" timeOffset="3691.2953">15770 12713 0,'0'0'31,"40"0"-15,0 0-16,-40 0 16,40 0-16,0 0 15,0 0 1,-40 0-16,40 0 15,1 0 1,-1 0-16,-40 0 31,40 0-31,0 0 16,0 0-16,-40 0 15</inkml:trace>
+  <inkml:trace contextRef="#ctx0" brushRef="#br0" timeOffset="4442.3554">15890 12874 0,'0'0'47,"40"0"-47,-40 0 15,40 0-15,-40 0 16,81 0 0,-81 0-16,40 0 15,-40 0 1,80 0-16,-80 0 15,40 0 1,-40 0-16,80-40 16,-80 40-1,40 0-15,-40 0 16,41 0-16,-1 0 31,-40 0-15,0 0-1,40-41-15</inkml:trace>
+  <inkml:trace contextRef="#ctx0" brushRef="#br0" timeOffset="4932.3946">16492 12793 0,'0'0'16,"0"0"-16,0 41 15,0-1 1,0-40-1,0 40-15,0-40 16,0 40 15,0 0 0</inkml:trace>
+  <inkml:trace contextRef="#ctx0" brushRef="#br0" timeOffset="5472.4378">16693 12553 0,'0'0'93,"0"40"-77,0-40-16,0 40 15,0-40-15,0 40 32,0 0-32,0-40 0,0 40 15,0-40 1,0 40-1</inkml:trace>
+  <inkml:trace contextRef="#ctx0" brushRef="#br0" timeOffset="6042.4834">16853 12553 0,'0'0'62,"0"40"-15,0-40-16,0 40 0,0-40-15,0 40-1,0 0 1,0 0 0</inkml:trace>
+  <inkml:trace contextRef="#ctx0" brushRef="#br0" timeOffset="6672.5338">16532 12713 0,'0'-40'16,"0"40"15,0 0-15,40 0-16,-40 0 15,40 0-15,41 0 16,-41 0 0,0 0-16,40 0 15,-80 0 1,40 0-16,-40 0 15,80 0 1,-80 0-16</inkml:trace>
+  <inkml:trace contextRef="#ctx0" brushRef="#br0" timeOffset="7203.5763">16693 12753 0,'40'0'16,"-40"0"-16,40 0 16,0 0-1,0 0-15,-40 0 16,40 0-1,0 0-15,0 0 16,-40 0-16,41 0 16,-41 0-1,40 0 1,-40 0-1</inkml:trace>
+  <inkml:trace contextRef="#ctx0" brushRef="#br0" timeOffset="7963.6371">17014 12433 0,'0'0'16,"0"0"15,40 0-31,-40 0 15,40 40 1,-40 0-16,40 40 16,0 0-1,-40-40-15,0 40 16,0-80-1,0 41-15,0-1 16,0 0 0,0-40-1,0 40-15,0-40 16</inkml:trace>
+  <inkml:trace contextRef="#ctx0" brushRef="#br0" timeOffset="11234.8988">16331 16122 0,'0'0'31,"0"0"-15,0 40 0,0-40-1,0 0-15,0 40 16,0 1-1,0-41-15,0 40 16,0-40 0,0 40-1,0 0 16,0-40 1,41 0 77</inkml:trace>
+  <inkml:trace contextRef="#ctx0" brushRef="#br0" timeOffset="12656.0125">16372 16122 0,'40'0'62,"0"0"-46,-40 0-1,40 0 16,-40 0-15,40 0 15,-40 0-15,40 0-1,0 0 17,0 0-32,-40 0 15,41 0 1,-1 0-16,0 0 15,-40 0-15,40 0 16,0 0 0,40 0-16,-80 0 15,40 0 1,81 0-16,-81 0 15,-40 0 1,40 0-16,0 0 16,40 0-1,-80 0-15,41 0 16,39 0-16,0 0 15,-40 0 1,40 0-16,-80 0 16,41 0-1,-1 0-15,-40 0 16,80 0-1,-40 0-15,0 0 16,-40 0 0,40 0-16,0 0 15,1 0-15,39 0 16,-40 0-1,0 0-15,0 0 16,-40 0 0,81 0-16,-41 0 15,0 0 1,-40 0-16,40 0 15,0 0 1,0 0-16,-40 0 16,40 0-16,0 0 15,1 0 1,-41 0-1,40 0 1,-40 0-16,40 0 16,-40 0-1,40 0 16,0 0-15,-40 0 0</inkml:trace>
+  <inkml:trace contextRef="#ctx0" brushRef="#br0" timeOffset="13416.0733">18538 16122 0,'0'0'78,"0"40"-63,0-40 1,0 40-16,0 1 16,0-1-16,0-40 15,0 40 1,0 0-16,0-40 15,0 40 1,0 0 15,0 0-31,0 0 16,-40-40-1,40 40-15,0 0 16,0-40 15</inkml:trace>
+  <inkml:trace contextRef="#ctx0" brushRef="#br0" timeOffset="15276.2221">17375 16563 0,'-40'0'47,"40"0"31,-41 0-63,1 0 1,40 0 0,0 0-1,-40 0 1,40 0-1,-40 0 1,0 0-16,0 0 16,40 0-16,-40 0 15,40 0 1,-40 0 15,40 0-15,0 40-1,0-40-15,0 41 31,0-41-31,0 40 16,0-40 0,0 0-1,0 40 16,40 0-15,-40-40 0,0 0-1,40 0 1,0 0-1,-40 0 1,40 0 0,-40 0 15,40 0-16,-40 0 1,40 0 0,0 0 15,-40 0 0,41 0 0,-41 40 47,0-40-62,0 40-1,0-40-15,0 40 16,0 0 0,0-40-1,0 40 1,0-40-16,0 41 15,0-1 32,0-40-31,-41 0-1,1 0 17,0 0-32,40 0 31,-40 0-16,0 0 1,0 0 15,40 0-15,0 0-1,-40 0-15,40-40 16,-40 40-16,40 0 31</inkml:trace>
+  <inkml:trace contextRef="#ctx0" brushRef="#br0" timeOffset="16976.3581">17776 16563 0,'0'0'62,"0"0"-31,-40 0-15,40 0 0,0 40-1,-40-40-15,40 0 31,0 41-31,-40-41 16,40 40 0,0-40-1,0 40 1,0 0-16,0-40 15,0 40 1,0-40 0,0 40-16,0-40 15,0 40 1,0 0 15,0-40-15,0 0-1,0 40 1,0-40-16,40 0 15,-40 0 1,0 0-16,40 0 47,-40 0-32,40 0 1,0 0 0,-40 0-1,40 0 16,-40 0-15,40 0 0,0 0-16,-40 0 15,0 0 1,41 0-1,-41 0 1,0 0-16,0-40 16,40 40-1,-40-40 1,0 40-16,0-40 15,0 40 1,0-40-16,0 40 31,0-40-31,0 0 16,0 40 15,0 0-31,0 0 16,0-40-1,0 40-15,0 0 16,-40 0-1,40-40 1,-41 40 0,41 0-1,-40 0-15,40-41 31,-40 41-15,40 0 15,-40 0-15,0 0 15,40 0 0</inkml:trace>
+  <inkml:trace contextRef="#ctx0" brushRef="#br0" timeOffset="19778.5822">18458 13676 0,'0'0'109,"0"0"-78,0 40-31,0 40 16,0 0 0,0 1-16,0-81 15,0 40-15,0 40 16,0-40-1,0 0-15,0 40 16,0-40 0,0 0-16,0 41 15,0-41 1,0 0-16,0 0 15,0 0 1,0 0-16,0 0 16,0 0-16,0 1 15,0 39 1,0-40-16,0 0 31,0 0-31,0-40 16,0 80-1,0-80-15,0 80 16,0-39-16,0-1 15,0 0 1,0 40-16,0-80 16,0 40-1,0 0-15,0 0 16,0-40-1,0 81-15,0-81 16,0 40 0,0 0-16,0 0 15,0 0-15,0-40 16,0 80-1,0-80-15,0 40 16,0 0 0,0 0-16,0 1 15,0-41 1,0 40-16,0 0 15,0-40-15,0 40 16,0-40 0,0 40-16,0 0 31,0 0-31,-40-40 31,40 40-31,-40 0 16,40-40-1,0 41-15,0-41 16,0 40-1,0-40 1,0 0-16</inkml:trace>
+  <inkml:trace contextRef="#ctx0" brushRef="#br0" timeOffset="21028.6823">18418 13716 0,'40'0'15,"0"0"1,-40 0 0,40 0 15,-40 0-16,41 0 17,-41 0-17,40 0 1,0 0-16,-40 0 15,40 0 1,0 0-16,0 0 31,-40 0-15,40 0-1,-40 0 17,40 0-17</inkml:trace>
+  <inkml:trace contextRef="#ctx0" brushRef="#br0" timeOffset="22168.7735">18779 14598 0,'0'0'78,"0"0"-63,0 0-15,40 0 16,-40 0-1,40 0 1,1 0 0,-1 0-1,-40 0-15,40 0 16,0 0-1,0 0-15,-40 0 16,40 0 0,-40 0-1,0 0 1,40 0-1,-40 0 1,0 0 31,0 40-47,0 0 15,0 1-15,0-41 16,0 80 0,0-40-16,0 0 15,0-40 1,-40 40-16,0 0 15,40 0 1,-40 0-16,40-40 16,-40 81-1,40-81-15,0 40 16,-40 0-16,40-40 15,0 40 1,-40-40-16,40 40 16,0-40-1,0 40-15,0 0 47</inkml:trace>
+  <inkml:trace contextRef="#ctx0" brushRef="#br0" timeOffset="23989.9192">19582 14678 0,'0'0'140,"0"0"-109,-40 0-31,-1 0 16,41 0 0,-40 0-1,40 0-15,-40 0 31,40 0-15,0 0 15,0 41-15,0-41-1,0 40-15,0 0 16,0-40 0,0 40-16,0-40 31,0 40 16,0-40-16,0 40 0,0-40 0,0 0 0,0 0-15,40 0 0,0 0-1,1 0 1,-41 0-16,40 0 15,-40 0-15,40 0 16,0 0 0,-40 0-1,40 0 1,-40 0 15,0 40-15,0-40 15,0 40-31,0-40 31,0 40-31,0-40 31,0 40 16,0 1-31,0-41 15,0 0-16,0 40-15,-40-40 16,0 0 0,40 0 15,-40 0-16,40 0 1,-40 0 0,40 0 15,-41 0 0,1 0-15,40 0-16,-40 0 31,40 0-31,0 0 31</inkml:trace>
+</inkml:ink>
 </file>
 
 <file path=ppt/notesMasters/notesMaster1.xml><?xml version="1.0" encoding="utf-8"?>
@@ -4944,6 +5068,57 @@
           </a:prstGeom>
         </p:spPr>
       </p:pic>
+      <mc:AlternateContent xmlns:mc="http://schemas.openxmlformats.org/markup-compatibility/2006">
+        <mc:Choice xmlns:p14="http://schemas.microsoft.com/office/powerpoint/2010/main" Requires="p14">
+          <p:contentPart p14:bwMode="auto" r:id="rId3">
+            <p14:nvContentPartPr>
+              <p14:cNvPr id="2" name="Ink 1">
+                <a:extLst>
+                  <a:ext uri="{FF2B5EF4-FFF2-40B4-BE49-F238E27FC236}">
+                    <a16:creationId xmlns:a16="http://schemas.microsoft.com/office/drawing/2014/main" id="{DC80FAA1-61A7-40B9-B45F-4678E2043DDB}"/>
+                  </a:ext>
+                </a:extLst>
+              </p14:cNvPr>
+              <p14:cNvContentPartPr/>
+              <p14:nvPr/>
+            </p14:nvContentPartPr>
+            <p14:xfrm>
+              <a:off x="664560" y="1386000"/>
+              <a:ext cx="7035120" cy="4346280"/>
+            </p14:xfrm>
+          </p:contentPart>
+        </mc:Choice>
+        <mc:Fallback>
+          <p:pic>
+            <p:nvPicPr>
+              <p:cNvPr id="2" name="Ink 1">
+                <a:extLst>
+                  <a:ext uri="{FF2B5EF4-FFF2-40B4-BE49-F238E27FC236}">
+                    <a16:creationId xmlns:a16="http://schemas.microsoft.com/office/drawing/2014/main" id="{DC80FAA1-61A7-40B9-B45F-4678E2043DDB}"/>
+                  </a:ext>
+                </a:extLst>
+              </p:cNvPr>
+              <p:cNvPicPr/>
+              <p:nvPr/>
+            </p:nvPicPr>
+            <p:blipFill>
+              <a:blip r:embed="rId4"/>
+              <a:stretch>
+                <a:fillRect/>
+              </a:stretch>
+            </p:blipFill>
+            <p:spPr>
+              <a:xfrm>
+                <a:off x="655200" y="1376640"/>
+                <a:ext cx="7053840" cy="4365000"/>
+              </a:xfrm>
+              <a:prstGeom prst="rect">
+                <a:avLst/>
+              </a:prstGeom>
+            </p:spPr>
+          </p:pic>
+        </mc:Fallback>
+      </mc:AlternateContent>
     </p:spTree>
     <p:extLst>
       <p:ext uri="{BB962C8B-B14F-4D97-AF65-F5344CB8AC3E}">
@@ -6102,6 +6277,57 @@
           </a:prstGeom>
         </p:spPr>
       </p:pic>
+      <mc:AlternateContent xmlns:mc="http://schemas.openxmlformats.org/markup-compatibility/2006">
+        <mc:Choice xmlns:p14="http://schemas.microsoft.com/office/powerpoint/2010/main" Requires="p14">
+          <p:contentPart p14:bwMode="auto" r:id="rId3">
+            <p14:nvContentPartPr>
+              <p14:cNvPr id="2" name="Ink 1">
+                <a:extLst>
+                  <a:ext uri="{FF2B5EF4-FFF2-40B4-BE49-F238E27FC236}">
+                    <a16:creationId xmlns:a16="http://schemas.microsoft.com/office/drawing/2014/main" id="{23518CA1-5705-4B53-8480-DB6A2439EF61}"/>
+                  </a:ext>
+                </a:extLst>
+              </p14:cNvPr>
+              <p14:cNvContentPartPr/>
+              <p14:nvPr/>
+            </p14:nvContentPartPr>
+            <p14:xfrm>
+              <a:off x="5619240" y="4475880"/>
+              <a:ext cx="1473840" cy="1660680"/>
+            </p14:xfrm>
+          </p:contentPart>
+        </mc:Choice>
+        <mc:Fallback>
+          <p:pic>
+            <p:nvPicPr>
+              <p:cNvPr id="2" name="Ink 1">
+                <a:extLst>
+                  <a:ext uri="{FF2B5EF4-FFF2-40B4-BE49-F238E27FC236}">
+                    <a16:creationId xmlns:a16="http://schemas.microsoft.com/office/drawing/2014/main" id="{23518CA1-5705-4B53-8480-DB6A2439EF61}"/>
+                  </a:ext>
+                </a:extLst>
+              </p:cNvPr>
+              <p:cNvPicPr/>
+              <p:nvPr/>
+            </p:nvPicPr>
+            <p:blipFill>
+              <a:blip r:embed="rId4"/>
+              <a:stretch>
+                <a:fillRect/>
+              </a:stretch>
+            </p:blipFill>
+            <p:spPr>
+              <a:xfrm>
+                <a:off x="5609880" y="4466520"/>
+                <a:ext cx="1492560" cy="1679400"/>
+              </a:xfrm>
+              <a:prstGeom prst="rect">
+                <a:avLst/>
+              </a:prstGeom>
+            </p:spPr>
+          </p:pic>
+        </mc:Fallback>
+      </mc:AlternateContent>
     </p:spTree>
     <p:extLst>
       <p:ext uri="{BB962C8B-B14F-4D97-AF65-F5344CB8AC3E}">
@@ -8208,8 +8434,13 @@
           <a:p>
             <a:r>
               <a:rPr lang="en-US" b="1" dirty="0"/>
-              <a:t>Take your house and email me the link and the exported zip of your project.</a:t>
-            </a:r>
+              <a:t>Take your house </a:t>
+            </a:r>
+            <a:r>
+              <a:rPr lang="en-US" b="1"/>
+              <a:t>and submit the link on Canvas.</a:t>
+            </a:r>
+            <a:endParaRPr lang="en-US" b="1" dirty="0"/>
           </a:p>
           <a:p>
             <a:r>

</xml_diff>